<commit_message>
Zapoceto poglavlje o repozitorijumu
</commit_message>
<xml_diff>
--- a/Asseco SEE - CAK - Git intro.pptx
+++ b/Asseco SEE - CAK - Git intro.pptx
@@ -5,32 +5,36 @@
     <p:sldMasterId id="2147483728" r:id="rId1"/>
   </p:sldMasterIdLst>
   <p:notesMasterIdLst>
-    <p:notesMasterId r:id="rId22"/>
+    <p:notesMasterId r:id="rId26"/>
   </p:notesMasterIdLst>
   <p:handoutMasterIdLst>
-    <p:handoutMasterId r:id="rId23"/>
+    <p:handoutMasterId r:id="rId27"/>
   </p:handoutMasterIdLst>
   <p:sldIdLst>
     <p:sldId id="256" r:id="rId2"/>
     <p:sldId id="329" r:id="rId3"/>
     <p:sldId id="330" r:id="rId4"/>
     <p:sldId id="331" r:id="rId5"/>
-    <p:sldId id="335" r:id="rId6"/>
+    <p:sldId id="311" r:id="rId6"/>
     <p:sldId id="336" r:id="rId7"/>
-    <p:sldId id="337" r:id="rId8"/>
-    <p:sldId id="311" r:id="rId9"/>
-    <p:sldId id="333" r:id="rId10"/>
-    <p:sldId id="334" r:id="rId11"/>
-    <p:sldId id="321" r:id="rId12"/>
-    <p:sldId id="322" r:id="rId13"/>
-    <p:sldId id="323" r:id="rId14"/>
-    <p:sldId id="324" r:id="rId15"/>
-    <p:sldId id="325" r:id="rId16"/>
-    <p:sldId id="326" r:id="rId17"/>
-    <p:sldId id="327" r:id="rId18"/>
-    <p:sldId id="328" r:id="rId19"/>
-    <p:sldId id="310" r:id="rId20"/>
-    <p:sldId id="332" r:id="rId21"/>
+    <p:sldId id="340" r:id="rId8"/>
+    <p:sldId id="341" r:id="rId9"/>
+    <p:sldId id="338" r:id="rId10"/>
+    <p:sldId id="337" r:id="rId11"/>
+    <p:sldId id="333" r:id="rId12"/>
+    <p:sldId id="339" r:id="rId13"/>
+    <p:sldId id="334" r:id="rId14"/>
+    <p:sldId id="321" r:id="rId15"/>
+    <p:sldId id="322" r:id="rId16"/>
+    <p:sldId id="335" r:id="rId17"/>
+    <p:sldId id="323" r:id="rId18"/>
+    <p:sldId id="324" r:id="rId19"/>
+    <p:sldId id="325" r:id="rId20"/>
+    <p:sldId id="326" r:id="rId21"/>
+    <p:sldId id="327" r:id="rId22"/>
+    <p:sldId id="328" r:id="rId23"/>
+    <p:sldId id="310" r:id="rId24"/>
+    <p:sldId id="332" r:id="rId25"/>
   </p:sldIdLst>
   <p:sldSz cx="9144000" cy="5143500" type="screen16x9"/>
   <p:notesSz cx="6797675" cy="9926638"/>
@@ -448,11 +452,11 @@
           <c:showBubbleSize val="0"/>
         </c:dLbls>
         <c:gapWidth val="20"/>
-        <c:axId val="461656568"/>
-        <c:axId val="465037352"/>
+        <c:axId val="468862992"/>
+        <c:axId val="468863776"/>
       </c:barChart>
       <c:catAx>
-        <c:axId val="461656568"/>
+        <c:axId val="468862992"/>
         <c:scaling>
           <c:orientation val="minMax"/>
         </c:scaling>
@@ -484,7 +488,7 @@
             <a:endParaRPr lang="en-US"/>
           </a:p>
         </c:txPr>
-        <c:crossAx val="465037352"/>
+        <c:crossAx val="468863776"/>
         <c:crosses val="autoZero"/>
         <c:auto val="1"/>
         <c:lblAlgn val="ctr"/>
@@ -492,7 +496,7 @@
         <c:noMultiLvlLbl val="0"/>
       </c:catAx>
       <c:valAx>
-        <c:axId val="465037352"/>
+        <c:axId val="468863776"/>
         <c:scaling>
           <c:orientation val="minMax"/>
         </c:scaling>
@@ -502,7 +506,7 @@
         <c:majorTickMark val="none"/>
         <c:minorTickMark val="none"/>
         <c:tickLblPos val="none"/>
-        <c:crossAx val="461656568"/>
+        <c:crossAx val="468862992"/>
         <c:crosses val="autoZero"/>
         <c:crossBetween val="between"/>
       </c:valAx>
@@ -769,11 +773,11 @@
           <c:showBubbleSize val="0"/>
         </c:dLbls>
         <c:gapWidth val="20"/>
-        <c:axId val="465031472"/>
-        <c:axId val="465031864"/>
+        <c:axId val="468860640"/>
+        <c:axId val="468861424"/>
       </c:barChart>
       <c:catAx>
-        <c:axId val="465031472"/>
+        <c:axId val="468860640"/>
         <c:scaling>
           <c:orientation val="minMax"/>
         </c:scaling>
@@ -802,7 +806,7 @@
             <a:endParaRPr lang="en-US"/>
           </a:p>
         </c:txPr>
-        <c:crossAx val="465031864"/>
+        <c:crossAx val="468861424"/>
         <c:crosses val="autoZero"/>
         <c:auto val="1"/>
         <c:lblAlgn val="ctr"/>
@@ -810,7 +814,7 @@
         <c:noMultiLvlLbl val="0"/>
       </c:catAx>
       <c:valAx>
-        <c:axId val="465031864"/>
+        <c:axId val="468861424"/>
         <c:scaling>
           <c:orientation val="minMax"/>
         </c:scaling>
@@ -828,7 +832,7 @@
         <c:majorTickMark val="none"/>
         <c:minorTickMark val="none"/>
         <c:tickLblPos val="none"/>
-        <c:crossAx val="465031472"/>
+        <c:crossAx val="468860640"/>
         <c:crosses val="autoZero"/>
         <c:crossBetween val="between"/>
       </c:valAx>
@@ -1147,11 +1151,11 @@
           <c:showBubbleSize val="0"/>
         </c:dLbls>
         <c:gapWidth val="20"/>
-        <c:axId val="465034608"/>
-        <c:axId val="465036568"/>
+        <c:axId val="468862208"/>
+        <c:axId val="468862600"/>
       </c:barChart>
       <c:catAx>
-        <c:axId val="465034608"/>
+        <c:axId val="468862208"/>
         <c:scaling>
           <c:orientation val="minMax"/>
         </c:scaling>
@@ -1183,7 +1187,7 @@
             <a:endParaRPr lang="en-US"/>
           </a:p>
         </c:txPr>
-        <c:crossAx val="465036568"/>
+        <c:crossAx val="468862600"/>
         <c:crosses val="autoZero"/>
         <c:auto val="1"/>
         <c:lblAlgn val="ctr"/>
@@ -1191,7 +1195,7 @@
         <c:noMultiLvlLbl val="0"/>
       </c:catAx>
       <c:valAx>
-        <c:axId val="465036568"/>
+        <c:axId val="468862600"/>
         <c:scaling>
           <c:orientation val="minMax"/>
         </c:scaling>
@@ -1201,7 +1205,7 @@
         <c:majorTickMark val="none"/>
         <c:minorTickMark val="none"/>
         <c:tickLblPos val="none"/>
-        <c:crossAx val="465034608"/>
+        <c:crossAx val="468862208"/>
         <c:crosses val="autoZero"/>
         <c:crossBetween val="between"/>
       </c:valAx>
@@ -3925,22 +3929,22 @@
     </dgm:pt>
   </dgm:ptLst>
   <dgm:cxnLst>
+    <dgm:cxn modelId="{B1E8FA83-5F14-410C-9785-57AC07E9A16E}" type="presOf" srcId="{531FC1CD-7F9E-4325-808B-C409BC6F78AD}" destId="{C8420B00-97F6-4E5B-8E20-58DCFCBAA3A9}" srcOrd="0" destOrd="0" presId="urn:microsoft.com/office/officeart/2005/8/layout/hProcess7"/>
+    <dgm:cxn modelId="{DF9E2151-0F4E-4EED-85D2-BFC413EBD9BC}" type="presOf" srcId="{531FC1CD-7F9E-4325-808B-C409BC6F78AD}" destId="{B1942279-E2A1-4CC7-8146-AF070B25C1CA}" srcOrd="1" destOrd="0" presId="urn:microsoft.com/office/officeart/2005/8/layout/hProcess7"/>
+    <dgm:cxn modelId="{07E073F2-040E-4C66-AECD-57B83B03F765}" type="presOf" srcId="{A590395B-D359-4043-90CA-75DE4688C580}" destId="{18ACDC4C-C3C6-4F86-93B9-AF405B230B5A}" srcOrd="0" destOrd="0" presId="urn:microsoft.com/office/officeart/2005/8/layout/hProcess7"/>
+    <dgm:cxn modelId="{050A1859-784E-4FD5-A1D3-C0F25E29C7AB}" type="presOf" srcId="{6A24C6E5-D620-44F3-9FD1-AA90931FCFC0}" destId="{B6864584-7721-4736-8978-9895FA7D30CF}" srcOrd="0" destOrd="0" presId="urn:microsoft.com/office/officeart/2005/8/layout/hProcess7"/>
+    <dgm:cxn modelId="{BFD9A913-AC04-4040-9127-FDABC21DBECA}" srcId="{6A24C6E5-D620-44F3-9FD1-AA90931FCFC0}" destId="{531FC1CD-7F9E-4325-808B-C409BC6F78AD}" srcOrd="2" destOrd="0" parTransId="{888611D6-4482-4134-88CF-1995BEE159B0}" sibTransId="{7DDD4EB0-5B5E-4F73-9527-32EDCBA9C7D3}"/>
+    <dgm:cxn modelId="{57CB3734-DFEE-49B6-AD3E-B0C0A16E751F}" type="presOf" srcId="{29D83302-7225-45A3-9ED6-1AAA9B674AFC}" destId="{D59B15BA-AF02-4C5C-953D-719DA02F1DF2}" srcOrd="1" destOrd="0" presId="urn:microsoft.com/office/officeart/2005/8/layout/hProcess7"/>
+    <dgm:cxn modelId="{A7DF782E-C673-4D89-81FD-176BF397FC72}" type="presOf" srcId="{2D690301-AFD6-4657-82F7-28757988BD65}" destId="{BB3EA566-2DFA-4734-82BF-F180A00DAFCF}" srcOrd="0" destOrd="0" presId="urn:microsoft.com/office/officeart/2005/8/layout/hProcess7"/>
+    <dgm:cxn modelId="{16BFC620-851A-4647-9AF4-B186A5FBBC9C}" type="presOf" srcId="{D5B20A87-1103-404C-ABAD-436A5469F96C}" destId="{F68A630E-A893-4969-A113-A2A53C2297D7}" srcOrd="0" destOrd="0" presId="urn:microsoft.com/office/officeart/2005/8/layout/hProcess7"/>
+    <dgm:cxn modelId="{A61F067B-F7C9-41F7-B46D-1FB7403123AC}" type="presOf" srcId="{9C472ABF-03D9-425F-AC04-118A8A9B72A4}" destId="{195B90F1-BF1C-45E0-AB7D-77923378C7FA}" srcOrd="0" destOrd="0" presId="urn:microsoft.com/office/officeart/2005/8/layout/hProcess7"/>
+    <dgm:cxn modelId="{E08997CA-7540-44B9-BC29-14021A2DCB95}" srcId="{A590395B-D359-4043-90CA-75DE4688C580}" destId="{D5B20A87-1103-404C-ABAD-436A5469F96C}" srcOrd="0" destOrd="0" parTransId="{F7550A7E-6B54-4082-968E-74008F0036E8}" sibTransId="{DEE6C9BF-0605-46B0-AB02-8EC6F77A462A}"/>
     <dgm:cxn modelId="{4E32A497-CD32-436D-B062-8F31FE46AE69}" srcId="{6A24C6E5-D620-44F3-9FD1-AA90931FCFC0}" destId="{A590395B-D359-4043-90CA-75DE4688C580}" srcOrd="0" destOrd="0" parTransId="{93EB4A3B-84D6-4E27-8EEC-CE7312D9E84F}" sibTransId="{FC737314-4BA9-48D8-9223-5FA2938E547D}"/>
     <dgm:cxn modelId="{5ABA5BCB-9C96-461A-AE77-8350927AD390}" srcId="{6A24C6E5-D620-44F3-9FD1-AA90931FCFC0}" destId="{29D83302-7225-45A3-9ED6-1AAA9B674AFC}" srcOrd="1" destOrd="0" parTransId="{F16BF98B-1A19-452D-A0A6-494EB2F9E031}" sibTransId="{515D4ECD-9823-4073-8D9F-37EC3FE81893}"/>
-    <dgm:cxn modelId="{B1E8FA83-5F14-410C-9785-57AC07E9A16E}" type="presOf" srcId="{531FC1CD-7F9E-4325-808B-C409BC6F78AD}" destId="{C8420B00-97F6-4E5B-8E20-58DCFCBAA3A9}" srcOrd="0" destOrd="0" presId="urn:microsoft.com/office/officeart/2005/8/layout/hProcess7"/>
-    <dgm:cxn modelId="{A7DF782E-C673-4D89-81FD-176BF397FC72}" type="presOf" srcId="{2D690301-AFD6-4657-82F7-28757988BD65}" destId="{BB3EA566-2DFA-4734-82BF-F180A00DAFCF}" srcOrd="0" destOrd="0" presId="urn:microsoft.com/office/officeart/2005/8/layout/hProcess7"/>
-    <dgm:cxn modelId="{16BFC620-851A-4647-9AF4-B186A5FBBC9C}" type="presOf" srcId="{D5B20A87-1103-404C-ABAD-436A5469F96C}" destId="{F68A630E-A893-4969-A113-A2A53C2297D7}" srcOrd="0" destOrd="0" presId="urn:microsoft.com/office/officeart/2005/8/layout/hProcess7"/>
-    <dgm:cxn modelId="{BFD9A913-AC04-4040-9127-FDABC21DBECA}" srcId="{6A24C6E5-D620-44F3-9FD1-AA90931FCFC0}" destId="{531FC1CD-7F9E-4325-808B-C409BC6F78AD}" srcOrd="2" destOrd="0" parTransId="{888611D6-4482-4134-88CF-1995BEE159B0}" sibTransId="{7DDD4EB0-5B5E-4F73-9527-32EDCBA9C7D3}"/>
+    <dgm:cxn modelId="{52A6A24C-F6AF-405F-9172-6397B14A80E9}" type="presOf" srcId="{29D83302-7225-45A3-9ED6-1AAA9B674AFC}" destId="{5B2FA46C-FCB1-42EB-BB48-944511A8FF9C}" srcOrd="0" destOrd="0" presId="urn:microsoft.com/office/officeart/2005/8/layout/hProcess7"/>
+    <dgm:cxn modelId="{BD42EB18-CBD2-4851-A1D7-14DD59AC254C}" srcId="{531FC1CD-7F9E-4325-808B-C409BC6F78AD}" destId="{9C472ABF-03D9-425F-AC04-118A8A9B72A4}" srcOrd="0" destOrd="0" parTransId="{13D370B1-25C4-426B-9A1D-FC574894DC4B}" sibTransId="{6C5E1439-8444-492E-AEEC-49690B1584D3}"/>
     <dgm:cxn modelId="{F1AED5D1-2694-4E8E-92DC-A7FF89F280C9}" srcId="{29D83302-7225-45A3-9ED6-1AAA9B674AFC}" destId="{2D690301-AFD6-4657-82F7-28757988BD65}" srcOrd="0" destOrd="0" parTransId="{19C1D74D-D5F6-4E4C-AD10-2E211CDD4F90}" sibTransId="{B6361988-2627-45CD-92B0-65746944769D}"/>
     <dgm:cxn modelId="{02423480-67F3-4F0F-9C37-188AFFF628CE}" type="presOf" srcId="{A590395B-D359-4043-90CA-75DE4688C580}" destId="{92B53C85-CE86-43ED-93FF-8E682C863A19}" srcOrd="1" destOrd="0" presId="urn:microsoft.com/office/officeart/2005/8/layout/hProcess7"/>
-    <dgm:cxn modelId="{57CB3734-DFEE-49B6-AD3E-B0C0A16E751F}" type="presOf" srcId="{29D83302-7225-45A3-9ED6-1AAA9B674AFC}" destId="{D59B15BA-AF02-4C5C-953D-719DA02F1DF2}" srcOrd="1" destOrd="0" presId="urn:microsoft.com/office/officeart/2005/8/layout/hProcess7"/>
-    <dgm:cxn modelId="{52A6A24C-F6AF-405F-9172-6397B14A80E9}" type="presOf" srcId="{29D83302-7225-45A3-9ED6-1AAA9B674AFC}" destId="{5B2FA46C-FCB1-42EB-BB48-944511A8FF9C}" srcOrd="0" destOrd="0" presId="urn:microsoft.com/office/officeart/2005/8/layout/hProcess7"/>
-    <dgm:cxn modelId="{DF9E2151-0F4E-4EED-85D2-BFC413EBD9BC}" type="presOf" srcId="{531FC1CD-7F9E-4325-808B-C409BC6F78AD}" destId="{B1942279-E2A1-4CC7-8146-AF070B25C1CA}" srcOrd="1" destOrd="0" presId="urn:microsoft.com/office/officeart/2005/8/layout/hProcess7"/>
-    <dgm:cxn modelId="{A61F067B-F7C9-41F7-B46D-1FB7403123AC}" type="presOf" srcId="{9C472ABF-03D9-425F-AC04-118A8A9B72A4}" destId="{195B90F1-BF1C-45E0-AB7D-77923378C7FA}" srcOrd="0" destOrd="0" presId="urn:microsoft.com/office/officeart/2005/8/layout/hProcess7"/>
-    <dgm:cxn modelId="{BD42EB18-CBD2-4851-A1D7-14DD59AC254C}" srcId="{531FC1CD-7F9E-4325-808B-C409BC6F78AD}" destId="{9C472ABF-03D9-425F-AC04-118A8A9B72A4}" srcOrd="0" destOrd="0" parTransId="{13D370B1-25C4-426B-9A1D-FC574894DC4B}" sibTransId="{6C5E1439-8444-492E-AEEC-49690B1584D3}"/>
-    <dgm:cxn modelId="{E08997CA-7540-44B9-BC29-14021A2DCB95}" srcId="{A590395B-D359-4043-90CA-75DE4688C580}" destId="{D5B20A87-1103-404C-ABAD-436A5469F96C}" srcOrd="0" destOrd="0" parTransId="{F7550A7E-6B54-4082-968E-74008F0036E8}" sibTransId="{DEE6C9BF-0605-46B0-AB02-8EC6F77A462A}"/>
-    <dgm:cxn modelId="{07E073F2-040E-4C66-AECD-57B83B03F765}" type="presOf" srcId="{A590395B-D359-4043-90CA-75DE4688C580}" destId="{18ACDC4C-C3C6-4F86-93B9-AF405B230B5A}" srcOrd="0" destOrd="0" presId="urn:microsoft.com/office/officeart/2005/8/layout/hProcess7"/>
-    <dgm:cxn modelId="{050A1859-784E-4FD5-A1D3-C0F25E29C7AB}" type="presOf" srcId="{6A24C6E5-D620-44F3-9FD1-AA90931FCFC0}" destId="{B6864584-7721-4736-8978-9895FA7D30CF}" srcOrd="0" destOrd="0" presId="urn:microsoft.com/office/officeart/2005/8/layout/hProcess7"/>
     <dgm:cxn modelId="{7523C522-FDF1-4A2A-A853-27C1BE4C899D}" type="presParOf" srcId="{B6864584-7721-4736-8978-9895FA7D30CF}" destId="{A804DC0D-F5C8-49EA-B0DB-5FFCAADFE586}" srcOrd="0" destOrd="0" presId="urn:microsoft.com/office/officeart/2005/8/layout/hProcess7"/>
     <dgm:cxn modelId="{0F63B9FF-DC4F-4998-8A8D-5911C5BE58B9}" type="presParOf" srcId="{A804DC0D-F5C8-49EA-B0DB-5FFCAADFE586}" destId="{18ACDC4C-C3C6-4F86-93B9-AF405B230B5A}" srcOrd="0" destOrd="0" presId="urn:microsoft.com/office/officeart/2005/8/layout/hProcess7"/>
     <dgm:cxn modelId="{BE85AD37-95DA-4723-A67D-D440CB5A9578}" type="presParOf" srcId="{A804DC0D-F5C8-49EA-B0DB-5FFCAADFE586}" destId="{92B53C85-CE86-43ED-93FF-8E682C863A19}" srcOrd="1" destOrd="0" presId="urn:microsoft.com/office/officeart/2005/8/layout/hProcess7"/>
@@ -6794,7 +6798,7 @@
           <a:p>
             <a:fld id="{8058D9CF-951F-4DB7-A66F-C025D3B84BF9}" type="datetimeFigureOut">
               <a:rPr lang="pl-PL" sz="1000" smtClean="0"/>
-              <a:t>2018-03-20</a:t>
+              <a:t>2018-03-23</a:t>
             </a:fld>
             <a:endParaRPr lang="pl-PL" sz="1000"/>
           </a:p>
@@ -6898,7 +6902,7 @@
             <a:fld id="{4CEB447A-91AE-4BEF-8DAE-D1B3BDF93E14}" type="datetimeFigureOut">
               <a:rPr lang="pl-PL" smtClean="0"/>
               <a:pPr/>
-              <a:t>2018-03-20</a:t>
+              <a:t>2018-03-23</a:t>
             </a:fld>
             <a:endParaRPr lang="pl-PL"/>
           </a:p>
@@ -15644,6 +15648,415 @@
           <a:bodyPr/>
           <a:lstStyle/>
           <a:p>
+            <a:endParaRPr lang="en-US"/>
+          </a:p>
+        </p:txBody>
+      </p:sp>
+      <p:sp>
+        <p:nvSpPr>
+          <p:cNvPr id="4" name="Title 3"/>
+          <p:cNvSpPr>
+            <a:spLocks noGrp="1"/>
+          </p:cNvSpPr>
+          <p:nvPr>
+            <p:ph type="title"/>
+          </p:nvPr>
+        </p:nvSpPr>
+        <p:spPr/>
+        <p:txBody>
+          <a:bodyPr/>
+          <a:lstStyle/>
+          <a:p>
+            <a:r>
+              <a:rPr lang="en-US" dirty="0" smtClean="0"/>
+              <a:t>GIT ISPRAVNA IMENA</a:t>
+            </a:r>
+            <a:endParaRPr lang="en-US" dirty="0"/>
+          </a:p>
+        </p:txBody>
+      </p:sp>
+      <p:sp>
+        <p:nvSpPr>
+          <p:cNvPr id="5" name="Text Placeholder 4"/>
+          <p:cNvSpPr>
+            <a:spLocks noGrp="1"/>
+          </p:cNvSpPr>
+          <p:nvPr>
+            <p:ph type="body" sz="quarter" idx="14"/>
+          </p:nvPr>
+        </p:nvSpPr>
+        <p:spPr/>
+        <p:txBody>
+          <a:bodyPr/>
+          <a:lstStyle/>
+          <a:p>
+            <a:r>
+              <a:rPr lang="en-US" dirty="0"/>
+              <a:t>Valid naming is discussed in Section 8.3, Using</a:t>
+            </a:r>
+          </a:p>
+          <a:p>
+            <a:r>
+              <a:rPr lang="en-US" dirty="0"/>
+              <a:t>Valid Names for Tags and Branches, on page 114</a:t>
+            </a:r>
+          </a:p>
+        </p:txBody>
+      </p:sp>
+    </p:spTree>
+    <p:extLst>
+      <p:ext uri="{BB962C8B-B14F-4D97-AF65-F5344CB8AC3E}">
+        <p14:creationId xmlns:p14="http://schemas.microsoft.com/office/powerpoint/2010/main" val="3953076804"/>
+      </p:ext>
+    </p:extLst>
+  </p:cSld>
+  <p:clrMapOvr>
+    <a:masterClrMapping/>
+  </p:clrMapOvr>
+  <mc:AlternateContent xmlns:mc="http://schemas.openxmlformats.org/markup-compatibility/2006" xmlns:p14="http://schemas.microsoft.com/office/powerpoint/2010/main">
+    <mc:Choice Requires="p14">
+      <p:transition spd="med" p14:dur="700">
+        <p:fade/>
+      </p:transition>
+    </mc:Choice>
+    <mc:Fallback xmlns="">
+      <p:transition spd="med">
+        <p:fade/>
+      </p:transition>
+    </mc:Fallback>
+  </mc:AlternateContent>
+  <p:timing>
+    <p:tnLst>
+      <p:par>
+        <p:cTn id="1" dur="indefinite" restart="never" nodeType="tmRoot"/>
+      </p:par>
+    </p:tnLst>
+  </p:timing>
+</p:sld>
+</file>
+
+<file path=ppt/slides/slide11.xml><?xml version="1.0" encoding="utf-8"?>
+<p:sld xmlns:a="http://schemas.openxmlformats.org/drawingml/2006/main" xmlns:r="http://schemas.openxmlformats.org/officeDocument/2006/relationships" xmlns:p="http://schemas.openxmlformats.org/presentationml/2006/main">
+  <p:cSld>
+    <p:spTree>
+      <p:nvGrpSpPr>
+        <p:cNvPr id="1" name=""/>
+        <p:cNvGrpSpPr/>
+        <p:nvPr/>
+      </p:nvGrpSpPr>
+      <p:grpSpPr>
+        <a:xfrm>
+          <a:off x="0" y="0"/>
+          <a:ext cx="0" cy="0"/>
+          <a:chOff x="0" y="0"/>
+          <a:chExt cx="0" cy="0"/>
+        </a:xfrm>
+      </p:grpSpPr>
+      <p:sp>
+        <p:nvSpPr>
+          <p:cNvPr id="2" name="Symbol zastępczy numeru slajdu 1"/>
+          <p:cNvSpPr>
+            <a:spLocks noGrp="1"/>
+          </p:cNvSpPr>
+          <p:nvPr>
+            <p:ph type="sldNum" sz="quarter" idx="12"/>
+          </p:nvPr>
+        </p:nvSpPr>
+        <p:spPr/>
+        <p:txBody>
+          <a:bodyPr/>
+          <a:lstStyle/>
+          <a:p>
+            <a:fld id="{9DC1E638-3F78-4E0D-883A-B278700C48C0}" type="slidenum">
+              <a:rPr lang="pl-PL" smtClean="0"/>
+              <a:pPr/>
+              <a:t>11</a:t>
+            </a:fld>
+            <a:endParaRPr lang="pl-PL"/>
+          </a:p>
+        </p:txBody>
+      </p:sp>
+      <p:sp>
+        <p:nvSpPr>
+          <p:cNvPr id="3" name="Symbol zastępczy tekstu 2"/>
+          <p:cNvSpPr>
+            <a:spLocks noGrp="1"/>
+          </p:cNvSpPr>
+          <p:nvPr>
+            <p:ph type="body" sz="quarter" idx="13"/>
+          </p:nvPr>
+        </p:nvSpPr>
+        <p:spPr/>
+        <p:txBody>
+          <a:bodyPr/>
+          <a:lstStyle/>
+          <a:p>
+            <a:r>
+              <a:rPr lang="sr-Latn-RS" dirty="0" smtClean="0"/>
+              <a:t>Šta je branch?</a:t>
+            </a:r>
+          </a:p>
+          <a:p>
+            <a:r>
+              <a:rPr lang="sr-Latn-RS" dirty="0" smtClean="0"/>
+              <a:t>Merge branches?</a:t>
+            </a:r>
+          </a:p>
+          <a:p>
+            <a:r>
+              <a:rPr lang="sr-Latn-RS" smtClean="0"/>
+              <a:t>Strategije spajanja branchova?</a:t>
+            </a:r>
+            <a:endParaRPr lang="sr-Latn-RS" dirty="0" smtClean="0"/>
+          </a:p>
+          <a:p>
+            <a:endParaRPr lang="en-US" dirty="0"/>
+          </a:p>
+        </p:txBody>
+      </p:sp>
+      <p:sp>
+        <p:nvSpPr>
+          <p:cNvPr id="4" name="Tytuł 3"/>
+          <p:cNvSpPr>
+            <a:spLocks noGrp="1"/>
+          </p:cNvSpPr>
+          <p:nvPr>
+            <p:ph type="title"/>
+          </p:nvPr>
+        </p:nvSpPr>
+        <p:spPr/>
+        <p:txBody>
+          <a:bodyPr/>
+          <a:lstStyle/>
+          <a:p>
+            <a:r>
+              <a:rPr lang="en-US" dirty="0"/>
+              <a:t>Branches</a:t>
+            </a:r>
+          </a:p>
+        </p:txBody>
+      </p:sp>
+    </p:spTree>
+    <p:extLst>
+      <p:ext uri="{BB962C8B-B14F-4D97-AF65-F5344CB8AC3E}">
+        <p14:creationId xmlns:p14="http://schemas.microsoft.com/office/powerpoint/2010/main" val="764560161"/>
+      </p:ext>
+    </p:extLst>
+  </p:cSld>
+  <p:clrMapOvr>
+    <a:masterClrMapping/>
+  </p:clrMapOvr>
+  <mc:AlternateContent xmlns:mc="http://schemas.openxmlformats.org/markup-compatibility/2006" xmlns:p14="http://schemas.microsoft.com/office/powerpoint/2010/main">
+    <mc:Choice Requires="p14">
+      <p:transition spd="med" p14:dur="700">
+        <p:fade/>
+      </p:transition>
+    </mc:Choice>
+    <mc:Fallback xmlns="">
+      <p:transition spd="med">
+        <p:fade/>
+      </p:transition>
+    </mc:Fallback>
+  </mc:AlternateContent>
+  <p:timing>
+    <p:tnLst>
+      <p:par>
+        <p:cTn id="1" dur="indefinite" restart="never" nodeType="tmRoot"/>
+      </p:par>
+    </p:tnLst>
+  </p:timing>
+</p:sld>
+</file>
+
+<file path=ppt/slides/slide12.xml><?xml version="1.0" encoding="utf-8"?>
+<p:sld xmlns:a="http://schemas.openxmlformats.org/drawingml/2006/main" xmlns:r="http://schemas.openxmlformats.org/officeDocument/2006/relationships" xmlns:p="http://schemas.openxmlformats.org/presentationml/2006/main">
+  <p:cSld>
+    <p:spTree>
+      <p:nvGrpSpPr>
+        <p:cNvPr id="1" name=""/>
+        <p:cNvGrpSpPr/>
+        <p:nvPr/>
+      </p:nvGrpSpPr>
+      <p:grpSpPr>
+        <a:xfrm>
+          <a:off x="0" y="0"/>
+          <a:ext cx="0" cy="0"/>
+          <a:chOff x="0" y="0"/>
+          <a:chExt cx="0" cy="0"/>
+        </a:xfrm>
+      </p:grpSpPr>
+      <p:sp>
+        <p:nvSpPr>
+          <p:cNvPr id="2" name="Slide Number Placeholder 1"/>
+          <p:cNvSpPr>
+            <a:spLocks noGrp="1"/>
+          </p:cNvSpPr>
+          <p:nvPr>
+            <p:ph type="sldNum" sz="quarter" idx="12"/>
+          </p:nvPr>
+        </p:nvSpPr>
+        <p:spPr/>
+        <p:txBody>
+          <a:bodyPr/>
+          <a:lstStyle/>
+          <a:p>
+            <a:fld id="{9DC1E638-3F78-4E0D-883A-B278700C48C0}" type="slidenum">
+              <a:rPr lang="pl-PL" smtClean="0"/>
+              <a:pPr/>
+              <a:t>12</a:t>
+            </a:fld>
+            <a:endParaRPr lang="pl-PL"/>
+          </a:p>
+        </p:txBody>
+      </p:sp>
+      <p:sp>
+        <p:nvSpPr>
+          <p:cNvPr id="4" name="Title 3"/>
+          <p:cNvSpPr>
+            <a:spLocks noGrp="1"/>
+          </p:cNvSpPr>
+          <p:nvPr>
+            <p:ph type="title"/>
+          </p:nvPr>
+        </p:nvSpPr>
+        <p:spPr>
+          <a:xfrm>
+            <a:off x="394972" y="636151"/>
+            <a:ext cx="2118073" cy="594506"/>
+          </a:xfrm>
+        </p:spPr>
+        <p:txBody>
+          <a:bodyPr>
+            <a:normAutofit fontScale="90000"/>
+          </a:bodyPr>
+          <a:lstStyle/>
+          <a:p>
+            <a:r>
+              <a:rPr lang="sr-Latn-RS" dirty="0" smtClean="0"/>
+              <a:t>Organizacija GIT repozitorijuma</a:t>
+            </a:r>
+            <a:endParaRPr lang="en-US" dirty="0"/>
+          </a:p>
+        </p:txBody>
+      </p:sp>
+      <p:pic>
+        <p:nvPicPr>
+          <p:cNvPr id="6" name="Picture 5"/>
+          <p:cNvPicPr>
+            <a:picLocks noChangeAspect="1"/>
+          </p:cNvPicPr>
+          <p:nvPr/>
+        </p:nvPicPr>
+        <p:blipFill>
+          <a:blip r:embed="rId2">
+            <a:extLst>
+              <a:ext uri="{28A0092B-C50C-407E-A947-70E740481C1C}">
+                <a14:useLocalDpi xmlns:a14="http://schemas.microsoft.com/office/drawing/2010/main" val="0"/>
+              </a:ext>
+            </a:extLst>
+          </a:blip>
+          <a:stretch>
+            <a:fillRect/>
+          </a:stretch>
+        </p:blipFill>
+        <p:spPr>
+          <a:xfrm>
+            <a:off x="2826456" y="233796"/>
+            <a:ext cx="3528409" cy="4675909"/>
+          </a:xfrm>
+          <a:prstGeom prst="rect">
+            <a:avLst/>
+          </a:prstGeom>
+        </p:spPr>
+      </p:pic>
+    </p:spTree>
+    <p:extLst>
+      <p:ext uri="{BB962C8B-B14F-4D97-AF65-F5344CB8AC3E}">
+        <p14:creationId xmlns:p14="http://schemas.microsoft.com/office/powerpoint/2010/main" val="872535625"/>
+      </p:ext>
+    </p:extLst>
+  </p:cSld>
+  <p:clrMapOvr>
+    <a:masterClrMapping/>
+  </p:clrMapOvr>
+  <mc:AlternateContent xmlns:mc="http://schemas.openxmlformats.org/markup-compatibility/2006" xmlns:p14="http://schemas.microsoft.com/office/powerpoint/2010/main">
+    <mc:Choice Requires="p14">
+      <p:transition spd="med" p14:dur="700">
+        <p:fade/>
+      </p:transition>
+    </mc:Choice>
+    <mc:Fallback xmlns="">
+      <p:transition spd="med">
+        <p:fade/>
+      </p:transition>
+    </mc:Fallback>
+  </mc:AlternateContent>
+  <p:timing>
+    <p:tnLst>
+      <p:par>
+        <p:cTn id="1" dur="indefinite" restart="never" nodeType="tmRoot"/>
+      </p:par>
+    </p:tnLst>
+  </p:timing>
+</p:sld>
+</file>
+
+<file path=ppt/slides/slide13.xml><?xml version="1.0" encoding="utf-8"?>
+<p:sld xmlns:a="http://schemas.openxmlformats.org/drawingml/2006/main" xmlns:r="http://schemas.openxmlformats.org/officeDocument/2006/relationships" xmlns:p="http://schemas.openxmlformats.org/presentationml/2006/main">
+  <p:cSld>
+    <p:spTree>
+      <p:nvGrpSpPr>
+        <p:cNvPr id="1" name=""/>
+        <p:cNvGrpSpPr/>
+        <p:nvPr/>
+      </p:nvGrpSpPr>
+      <p:grpSpPr>
+        <a:xfrm>
+          <a:off x="0" y="0"/>
+          <a:ext cx="0" cy="0"/>
+          <a:chOff x="0" y="0"/>
+          <a:chExt cx="0" cy="0"/>
+        </a:xfrm>
+      </p:grpSpPr>
+      <p:sp>
+        <p:nvSpPr>
+          <p:cNvPr id="2" name="Slide Number Placeholder 1"/>
+          <p:cNvSpPr>
+            <a:spLocks noGrp="1"/>
+          </p:cNvSpPr>
+          <p:nvPr>
+            <p:ph type="sldNum" sz="quarter" idx="12"/>
+          </p:nvPr>
+        </p:nvSpPr>
+        <p:spPr/>
+        <p:txBody>
+          <a:bodyPr/>
+          <a:lstStyle/>
+          <a:p>
+            <a:fld id="{9DC1E638-3F78-4E0D-883A-B278700C48C0}" type="slidenum">
+              <a:rPr lang="pl-PL" smtClean="0"/>
+              <a:pPr/>
+              <a:t>13</a:t>
+            </a:fld>
+            <a:endParaRPr lang="pl-PL"/>
+          </a:p>
+        </p:txBody>
+      </p:sp>
+      <p:sp>
+        <p:nvSpPr>
+          <p:cNvPr id="3" name="Text Placeholder 2"/>
+          <p:cNvSpPr>
+            <a:spLocks noGrp="1"/>
+          </p:cNvSpPr>
+          <p:nvPr>
+            <p:ph type="body" sz="quarter" idx="13"/>
+          </p:nvPr>
+        </p:nvSpPr>
+        <p:spPr/>
+        <p:txBody>
+          <a:bodyPr/>
+          <a:lstStyle/>
+          <a:p>
             <a:r>
               <a:rPr lang="en-US" dirty="0" err="1" smtClean="0"/>
               <a:t>Git</a:t>
@@ -15762,7 +16175,7 @@
 </p:sld>
 </file>
 
-<file path=ppt/slides/slide11.xml><?xml version="1.0" encoding="utf-8"?>
+<file path=ppt/slides/slide14.xml><?xml version="1.0" encoding="utf-8"?>
 <p:sld xmlns:a="http://schemas.openxmlformats.org/drawingml/2006/main" xmlns:r="http://schemas.openxmlformats.org/officeDocument/2006/relationships" xmlns:p="http://schemas.openxmlformats.org/presentationml/2006/main">
   <p:cSld>
     <p:spTree>
@@ -15797,7 +16210,7 @@
             <a:fld id="{9DC1E638-3F78-4E0D-883A-B278700C48C0}" type="slidenum">
               <a:rPr lang="pl-PL" smtClean="0"/>
               <a:pPr/>
-              <a:t>11</a:t>
+              <a:t>14</a:t>
             </a:fld>
             <a:endParaRPr lang="pl-PL"/>
           </a:p>
@@ -15883,7 +16296,7 @@
 </p:sld>
 </file>
 
-<file path=ppt/slides/slide12.xml><?xml version="1.0" encoding="utf-8"?>
+<file path=ppt/slides/slide15.xml><?xml version="1.0" encoding="utf-8"?>
 <p:sld xmlns:a="http://schemas.openxmlformats.org/drawingml/2006/main" xmlns:r="http://schemas.openxmlformats.org/officeDocument/2006/relationships" xmlns:p="http://schemas.openxmlformats.org/presentationml/2006/main">
   <p:cSld>
     <p:spTree>
@@ -15918,7 +16331,7 @@
             <a:fld id="{9DC1E638-3F78-4E0D-883A-B278700C48C0}" type="slidenum">
               <a:rPr lang="pl-PL" smtClean="0"/>
               <a:pPr/>
-              <a:t>12</a:t>
+              <a:t>15</a:t>
             </a:fld>
             <a:endParaRPr lang="pl-PL"/>
           </a:p>
@@ -16004,7 +16417,208 @@
 </p:sld>
 </file>
 
-<file path=ppt/slides/slide13.xml><?xml version="1.0" encoding="utf-8"?>
+<file path=ppt/slides/slide16.xml><?xml version="1.0" encoding="utf-8"?>
+<p:sld xmlns:a="http://schemas.openxmlformats.org/drawingml/2006/main" xmlns:r="http://schemas.openxmlformats.org/officeDocument/2006/relationships" xmlns:p="http://schemas.openxmlformats.org/presentationml/2006/main">
+  <p:cSld>
+    <p:spTree>
+      <p:nvGrpSpPr>
+        <p:cNvPr id="1" name=""/>
+        <p:cNvGrpSpPr/>
+        <p:nvPr/>
+      </p:nvGrpSpPr>
+      <p:grpSpPr>
+        <a:xfrm>
+          <a:off x="0" y="0"/>
+          <a:ext cx="0" cy="0"/>
+          <a:chOff x="0" y="0"/>
+          <a:chExt cx="0" cy="0"/>
+        </a:xfrm>
+      </p:grpSpPr>
+      <p:sp>
+        <p:nvSpPr>
+          <p:cNvPr id="2" name="Slide Number Placeholder 1"/>
+          <p:cNvSpPr>
+            <a:spLocks noGrp="1"/>
+          </p:cNvSpPr>
+          <p:nvPr>
+            <p:ph type="sldNum" sz="quarter" idx="12"/>
+          </p:nvPr>
+        </p:nvSpPr>
+        <p:spPr/>
+        <p:txBody>
+          <a:bodyPr/>
+          <a:lstStyle/>
+          <a:p>
+            <a:fld id="{9DC1E638-3F78-4E0D-883A-B278700C48C0}" type="slidenum">
+              <a:rPr lang="pl-PL" smtClean="0"/>
+              <a:pPr/>
+              <a:t>16</a:t>
+            </a:fld>
+            <a:endParaRPr lang="pl-PL"/>
+          </a:p>
+        </p:txBody>
+      </p:sp>
+      <p:sp>
+        <p:nvSpPr>
+          <p:cNvPr id="3" name="Text Placeholder 2"/>
+          <p:cNvSpPr>
+            <a:spLocks noGrp="1"/>
+          </p:cNvSpPr>
+          <p:nvPr>
+            <p:ph type="body" sz="quarter" idx="13"/>
+          </p:nvPr>
+        </p:nvSpPr>
+        <p:spPr/>
+        <p:txBody>
+          <a:bodyPr/>
+          <a:lstStyle/>
+          <a:p>
+            <a:endParaRPr lang="en-US"/>
+          </a:p>
+        </p:txBody>
+      </p:sp>
+      <p:sp>
+        <p:nvSpPr>
+          <p:cNvPr id="4" name="Title 3"/>
+          <p:cNvSpPr>
+            <a:spLocks noGrp="1"/>
+          </p:cNvSpPr>
+          <p:nvPr>
+            <p:ph type="title"/>
+          </p:nvPr>
+        </p:nvSpPr>
+        <p:spPr/>
+        <p:txBody>
+          <a:bodyPr/>
+          <a:lstStyle/>
+          <a:p>
+            <a:r>
+              <a:rPr lang="en-US" dirty="0" smtClean="0"/>
+              <a:t>Bonus </a:t>
+            </a:r>
+            <a:r>
+              <a:rPr lang="en-US" dirty="0" err="1" smtClean="0"/>
+              <a:t>kako</a:t>
+            </a:r>
+            <a:r>
+              <a:rPr lang="en-US" dirty="0" smtClean="0"/>
+              <a:t> </a:t>
+            </a:r>
+            <a:r>
+              <a:rPr lang="en-US" dirty="0" err="1" smtClean="0"/>
+              <a:t>napisti</a:t>
+            </a:r>
+            <a:r>
+              <a:rPr lang="en-US" dirty="0" smtClean="0"/>
+              <a:t> </a:t>
+            </a:r>
+            <a:r>
+              <a:rPr lang="en-US" dirty="0" err="1" smtClean="0"/>
+              <a:t>dobru</a:t>
+            </a:r>
+            <a:r>
+              <a:rPr lang="en-US" dirty="0" smtClean="0"/>
+              <a:t> </a:t>
+            </a:r>
+            <a:r>
+              <a:rPr lang="en-US" dirty="0" err="1" smtClean="0"/>
+              <a:t>poruku</a:t>
+            </a:r>
+            <a:r>
+              <a:rPr lang="en-US" dirty="0" smtClean="0"/>
+              <a:t> </a:t>
+            </a:r>
+            <a:r>
+              <a:rPr lang="en-US" dirty="0" err="1" smtClean="0"/>
+              <a:t>za</a:t>
+            </a:r>
+            <a:r>
+              <a:rPr lang="en-US" dirty="0" smtClean="0"/>
+              <a:t> commit</a:t>
+            </a:r>
+            <a:endParaRPr lang="en-US" dirty="0"/>
+          </a:p>
+        </p:txBody>
+      </p:sp>
+      <p:sp>
+        <p:nvSpPr>
+          <p:cNvPr id="5" name="Text Placeholder 4"/>
+          <p:cNvSpPr>
+            <a:spLocks noGrp="1"/>
+          </p:cNvSpPr>
+          <p:nvPr>
+            <p:ph type="body" sz="quarter" idx="14"/>
+          </p:nvPr>
+        </p:nvSpPr>
+        <p:spPr/>
+        <p:txBody>
+          <a:bodyPr/>
+          <a:lstStyle/>
+          <a:p>
+            <a:r>
+              <a:rPr lang="en-US" dirty="0"/>
+              <a:t>Just like any other commit, make sure you explain why you’re making</a:t>
+            </a:r>
+          </a:p>
+          <a:p>
+            <a:r>
+              <a:rPr lang="en-US" dirty="0"/>
+              <a:t>this commit. Just marking that you’re reverting a change, like I did</a:t>
+            </a:r>
+          </a:p>
+          <a:p>
+            <a:r>
+              <a:rPr lang="en-US" dirty="0"/>
+              <a:t>here, doesn’t say much.</a:t>
+            </a:r>
+          </a:p>
+          <a:p>
+            <a:r>
+              <a:rPr lang="en-US" dirty="0"/>
+              <a:t>Did it not work? Was it too slow? Say that. You’ll thank yourself in six</a:t>
+            </a:r>
+          </a:p>
+          <a:p>
+            <a:r>
+              <a:rPr lang="en-US" dirty="0"/>
+              <a:t>months when you’re trying to remember why you reverted that change.</a:t>
+            </a:r>
+          </a:p>
+        </p:txBody>
+      </p:sp>
+    </p:spTree>
+    <p:extLst>
+      <p:ext uri="{BB962C8B-B14F-4D97-AF65-F5344CB8AC3E}">
+        <p14:creationId xmlns:p14="http://schemas.microsoft.com/office/powerpoint/2010/main" val="3210735741"/>
+      </p:ext>
+    </p:extLst>
+  </p:cSld>
+  <p:clrMapOvr>
+    <a:masterClrMapping/>
+  </p:clrMapOvr>
+  <mc:AlternateContent xmlns:mc="http://schemas.openxmlformats.org/markup-compatibility/2006" xmlns:p14="http://schemas.microsoft.com/office/powerpoint/2010/main">
+    <mc:Choice Requires="p14">
+      <p:transition spd="med" p14:dur="700">
+        <p:fade/>
+      </p:transition>
+    </mc:Choice>
+    <mc:Fallback xmlns="">
+      <p:transition spd="med">
+        <p:fade/>
+      </p:transition>
+    </mc:Fallback>
+  </mc:AlternateContent>
+  <p:timing>
+    <p:tnLst>
+      <p:par>
+        <p:cTn id="1" dur="indefinite" restart="never" nodeType="tmRoot"/>
+      </p:par>
+    </p:tnLst>
+  </p:timing>
+</p:sld>
+</file>
+
+<file path=ppt/slides/slide17.xml><?xml version="1.0" encoding="utf-8"?>
 <p:sld xmlns:a="http://schemas.openxmlformats.org/drawingml/2006/main" xmlns:r="http://schemas.openxmlformats.org/officeDocument/2006/relationships" xmlns:p="http://schemas.openxmlformats.org/presentationml/2006/main">
   <p:cSld>
     <p:spTree>
@@ -16062,7 +16676,7 @@
             <a:fld id="{9DC1E638-3F78-4E0D-883A-B278700C48C0}" type="slidenum">
               <a:rPr lang="pl-PL" smtClean="0"/>
               <a:pPr/>
-              <a:t>13</a:t>
+              <a:t>17</a:t>
             </a:fld>
             <a:endParaRPr lang="pl-PL"/>
           </a:p>
@@ -16100,7 +16714,7 @@
 </p:sld>
 </file>
 
-<file path=ppt/slides/slide14.xml><?xml version="1.0" encoding="utf-8"?>
+<file path=ppt/slides/slide18.xml><?xml version="1.0" encoding="utf-8"?>
 <p:sld xmlns:a="http://schemas.openxmlformats.org/drawingml/2006/main" xmlns:r="http://schemas.openxmlformats.org/officeDocument/2006/relationships" xmlns:p="http://schemas.openxmlformats.org/presentationml/2006/main">
   <p:cSld>
     <p:spTree>
@@ -16135,7 +16749,7 @@
             <a:fld id="{9DC1E638-3F78-4E0D-883A-B278700C48C0}" type="slidenum">
               <a:rPr lang="pl-PL" smtClean="0"/>
               <a:pPr/>
-              <a:t>14</a:t>
+              <a:t>18</a:t>
             </a:fld>
             <a:endParaRPr lang="pl-PL"/>
           </a:p>
@@ -17202,7 +17816,7 @@
 </p:sld>
 </file>
 
-<file path=ppt/slides/slide15.xml><?xml version="1.0" encoding="utf-8"?>
+<file path=ppt/slides/slide19.xml><?xml version="1.0" encoding="utf-8"?>
 <p:sld xmlns:a="http://schemas.openxmlformats.org/drawingml/2006/main" xmlns:r="http://schemas.openxmlformats.org/officeDocument/2006/relationships" xmlns:p="http://schemas.openxmlformats.org/presentationml/2006/main">
   <p:cSld>
     <p:spTree>
@@ -17237,7 +17851,7 @@
             <a:fld id="{9DC1E638-3F78-4E0D-883A-B278700C48C0}" type="slidenum">
               <a:rPr lang="pl-PL" smtClean="0"/>
               <a:pPr/>
-              <a:t>15</a:t>
+              <a:t>19</a:t>
             </a:fld>
             <a:endParaRPr lang="pl-PL"/>
           </a:p>
@@ -18335,7 +18949,186 @@
 </p:sld>
 </file>
 
-<file path=ppt/slides/slide16.xml><?xml version="1.0" encoding="utf-8"?>
+<file path=ppt/slides/slide2.xml><?xml version="1.0" encoding="utf-8"?>
+<p:sld xmlns:a="http://schemas.openxmlformats.org/drawingml/2006/main" xmlns:r="http://schemas.openxmlformats.org/officeDocument/2006/relationships" xmlns:p="http://schemas.openxmlformats.org/presentationml/2006/main">
+  <p:cSld>
+    <p:spTree>
+      <p:nvGrpSpPr>
+        <p:cNvPr id="1" name=""/>
+        <p:cNvGrpSpPr/>
+        <p:nvPr/>
+      </p:nvGrpSpPr>
+      <p:grpSpPr>
+        <a:xfrm>
+          <a:off x="0" y="0"/>
+          <a:ext cx="0" cy="0"/>
+          <a:chOff x="0" y="0"/>
+          <a:chExt cx="0" cy="0"/>
+        </a:xfrm>
+      </p:grpSpPr>
+      <p:sp>
+        <p:nvSpPr>
+          <p:cNvPr id="2" name="Podtytuł 1"/>
+          <p:cNvSpPr>
+            <a:spLocks noGrp="1"/>
+          </p:cNvSpPr>
+          <p:nvPr>
+            <p:ph type="subTitle" idx="1"/>
+          </p:nvPr>
+        </p:nvSpPr>
+        <p:spPr>
+          <a:xfrm>
+            <a:off x="838199" y="1876328"/>
+            <a:ext cx="7835283" cy="613335"/>
+          </a:xfrm>
+        </p:spPr>
+        <p:txBody>
+          <a:bodyPr/>
+          <a:lstStyle/>
+          <a:p>
+            <a:r>
+              <a:rPr lang="en-US" dirty="0" smtClean="0">
+                <a:solidFill>
+                  <a:schemeClr val="bg1"/>
+                </a:solidFill>
+              </a:rPr>
+              <a:t>GIT </a:t>
+            </a:r>
+            <a:r>
+              <a:rPr lang="en-US" dirty="0" smtClean="0"/>
+              <a:t>workshop</a:t>
+            </a:r>
+            <a:r>
+              <a:rPr lang="pl-PL" dirty="0" smtClean="0"/>
+              <a:t>.</a:t>
+            </a:r>
+            <a:endParaRPr lang="en-US" dirty="0"/>
+          </a:p>
+        </p:txBody>
+      </p:sp>
+      <p:sp>
+        <p:nvSpPr>
+          <p:cNvPr id="3" name="Symbol zastępczy stopki 2"/>
+          <p:cNvSpPr>
+            <a:spLocks noGrp="1"/>
+          </p:cNvSpPr>
+          <p:nvPr>
+            <p:ph type="ftr" sz="quarter" idx="11"/>
+          </p:nvPr>
+        </p:nvSpPr>
+        <p:spPr>
+          <a:xfrm>
+            <a:off x="838198" y="4767263"/>
+            <a:ext cx="5700216" cy="273844"/>
+          </a:xfrm>
+        </p:spPr>
+        <p:txBody>
+          <a:bodyPr/>
+          <a:lstStyle/>
+          <a:p>
+            <a:r>
+              <a:rPr lang="sr-Latn-RS" dirty="0" smtClean="0"/>
+              <a:t>Belgrade</a:t>
+            </a:r>
+            <a:r>
+              <a:rPr lang="en-US" dirty="0" smtClean="0"/>
+              <a:t>, </a:t>
+            </a:r>
+            <a:r>
+              <a:rPr lang="sr-Latn-RS" dirty="0" smtClean="0"/>
+              <a:t>04.01.2018</a:t>
+            </a:r>
+            <a:endParaRPr lang="en-US" dirty="0"/>
+          </a:p>
+        </p:txBody>
+      </p:sp>
+      <p:sp>
+        <p:nvSpPr>
+          <p:cNvPr id="4" name="Symbol zastępczy numeru slajdu 3"/>
+          <p:cNvSpPr>
+            <a:spLocks noGrp="1"/>
+          </p:cNvSpPr>
+          <p:nvPr>
+            <p:ph type="sldNum" sz="quarter" idx="12"/>
+          </p:nvPr>
+        </p:nvSpPr>
+        <p:spPr/>
+        <p:txBody>
+          <a:bodyPr/>
+          <a:lstStyle/>
+          <a:p>
+            <a:fld id="{9DC1E638-3F78-4E0D-883A-B278700C48C0}" type="slidenum">
+              <a:rPr lang="pl-PL" smtClean="0"/>
+              <a:pPr/>
+              <a:t>2</a:t>
+            </a:fld>
+            <a:endParaRPr lang="pl-PL" dirty="0"/>
+          </a:p>
+        </p:txBody>
+      </p:sp>
+      <p:sp>
+        <p:nvSpPr>
+          <p:cNvPr id="5" name="Symbol zastępczy tekstu 4"/>
+          <p:cNvSpPr>
+            <a:spLocks noGrp="1"/>
+          </p:cNvSpPr>
+          <p:nvPr>
+            <p:ph type="body" sz="quarter" idx="13"/>
+          </p:nvPr>
+        </p:nvSpPr>
+        <p:spPr>
+          <a:xfrm>
+            <a:off x="838199" y="3643313"/>
+            <a:ext cx="7829551" cy="314325"/>
+          </a:xfrm>
+        </p:spPr>
+        <p:txBody>
+          <a:bodyPr>
+            <a:normAutofit lnSpcReduction="10000"/>
+          </a:bodyPr>
+          <a:lstStyle/>
+          <a:p>
+            <a:r>
+              <a:rPr lang="en-US" dirty="0" smtClean="0"/>
+              <a:t>Distributed version control systems</a:t>
+            </a:r>
+            <a:endParaRPr lang="en-US" dirty="0"/>
+          </a:p>
+        </p:txBody>
+      </p:sp>
+    </p:spTree>
+    <p:extLst>
+      <p:ext uri="{BB962C8B-B14F-4D97-AF65-F5344CB8AC3E}">
+        <p14:creationId xmlns:p14="http://schemas.microsoft.com/office/powerpoint/2010/main" val="2613162352"/>
+      </p:ext>
+    </p:extLst>
+  </p:cSld>
+  <p:clrMapOvr>
+    <a:masterClrMapping/>
+  </p:clrMapOvr>
+  <mc:AlternateContent xmlns:mc="http://schemas.openxmlformats.org/markup-compatibility/2006" xmlns:p14="http://schemas.microsoft.com/office/powerpoint/2010/main">
+    <mc:Choice Requires="p14">
+      <p:transition spd="med" p14:dur="700">
+        <p:fade/>
+      </p:transition>
+    </mc:Choice>
+    <mc:Fallback xmlns="">
+      <p:transition spd="med">
+        <p:fade/>
+      </p:transition>
+    </mc:Fallback>
+  </mc:AlternateContent>
+  <p:timing>
+    <p:tnLst>
+      <p:par>
+        <p:cTn id="1" dur="indefinite" restart="never" nodeType="tmRoot"/>
+      </p:par>
+    </p:tnLst>
+  </p:timing>
+</p:sld>
+</file>
+
+<file path=ppt/slides/slide20.xml><?xml version="1.0" encoding="utf-8"?>
 <p:sld xmlns:a="http://schemas.openxmlformats.org/drawingml/2006/main" xmlns:r="http://schemas.openxmlformats.org/officeDocument/2006/relationships" xmlns:p="http://schemas.openxmlformats.org/presentationml/2006/main">
   <p:cSld>
     <p:spTree>
@@ -18370,7 +19163,7 @@
             <a:fld id="{9DC1E638-3F78-4E0D-883A-B278700C48C0}" type="slidenum">
               <a:rPr lang="pl-PL" smtClean="0"/>
               <a:pPr/>
-              <a:t>16</a:t>
+              <a:t>20</a:t>
             </a:fld>
             <a:endParaRPr lang="pl-PL"/>
           </a:p>
@@ -22703,7 +23496,7 @@
 </p:sld>
 </file>
 
-<file path=ppt/slides/slide17.xml><?xml version="1.0" encoding="utf-8"?>
+<file path=ppt/slides/slide21.xml><?xml version="1.0" encoding="utf-8"?>
 <p:sld xmlns:a="http://schemas.openxmlformats.org/drawingml/2006/main" xmlns:r="http://schemas.openxmlformats.org/officeDocument/2006/relationships" xmlns:p="http://schemas.openxmlformats.org/presentationml/2006/main">
   <p:cSld>
     <p:spTree>
@@ -22738,7 +23531,7 @@
             <a:fld id="{9DC1E638-3F78-4E0D-883A-B278700C48C0}" type="slidenum">
               <a:rPr lang="pl-PL" smtClean="0"/>
               <a:pPr/>
-              <a:t>17</a:t>
+              <a:t>21</a:t>
             </a:fld>
             <a:endParaRPr lang="pl-PL"/>
           </a:p>
@@ -23279,7 +24072,7 @@
 </p:sld>
 </file>
 
-<file path=ppt/slides/slide18.xml><?xml version="1.0" encoding="utf-8"?>
+<file path=ppt/slides/slide22.xml><?xml version="1.0" encoding="utf-8"?>
 <p:sld xmlns:a="http://schemas.openxmlformats.org/drawingml/2006/main" xmlns:r="http://schemas.openxmlformats.org/officeDocument/2006/relationships" xmlns:p="http://schemas.openxmlformats.org/presentationml/2006/main">
   <p:cSld>
     <p:spTree>
@@ -23349,7 +24142,7 @@
             <a:fld id="{9DC1E638-3F78-4E0D-883A-B278700C48C0}" type="slidenum">
               <a:rPr lang="pl-PL" smtClean="0"/>
               <a:pPr/>
-              <a:t>18</a:t>
+              <a:t>22</a:t>
             </a:fld>
             <a:endParaRPr lang="pl-PL"/>
           </a:p>
@@ -23432,7 +24225,7 @@
 </p:sld>
 </file>
 
-<file path=ppt/slides/slide19.xml><?xml version="1.0" encoding="utf-8"?>
+<file path=ppt/slides/slide23.xml><?xml version="1.0" encoding="utf-8"?>
 <p:sld xmlns:a="http://schemas.openxmlformats.org/drawingml/2006/main" xmlns:r="http://schemas.openxmlformats.org/officeDocument/2006/relationships" xmlns:p="http://schemas.openxmlformats.org/presentationml/2006/main">
   <p:cSld>
     <p:spTree>
@@ -23472,7 +24265,7 @@
             <a:fld id="{9DC1E638-3F78-4E0D-883A-B278700C48C0}" type="slidenum">
               <a:rPr lang="pl-PL" smtClean="0"/>
               <a:pPr/>
-              <a:t>19</a:t>
+              <a:t>23</a:t>
             </a:fld>
             <a:endParaRPr lang="pl-PL" dirty="0"/>
           </a:p>
@@ -23510,178 +24303,7 @@
 </p:sld>
 </file>
 
-<file path=ppt/slides/slide2.xml><?xml version="1.0" encoding="utf-8"?>
-<p:sld xmlns:a="http://schemas.openxmlformats.org/drawingml/2006/main" xmlns:r="http://schemas.openxmlformats.org/officeDocument/2006/relationships" xmlns:p="http://schemas.openxmlformats.org/presentationml/2006/main">
-  <p:cSld>
-    <p:spTree>
-      <p:nvGrpSpPr>
-        <p:cNvPr id="1" name=""/>
-        <p:cNvGrpSpPr/>
-        <p:nvPr/>
-      </p:nvGrpSpPr>
-      <p:grpSpPr>
-        <a:xfrm>
-          <a:off x="0" y="0"/>
-          <a:ext cx="0" cy="0"/>
-          <a:chOff x="0" y="0"/>
-          <a:chExt cx="0" cy="0"/>
-        </a:xfrm>
-      </p:grpSpPr>
-      <p:sp>
-        <p:nvSpPr>
-          <p:cNvPr id="2" name="Podtytuł 1"/>
-          <p:cNvSpPr>
-            <a:spLocks noGrp="1"/>
-          </p:cNvSpPr>
-          <p:nvPr>
-            <p:ph type="subTitle" idx="1"/>
-          </p:nvPr>
-        </p:nvSpPr>
-        <p:spPr>
-          <a:xfrm>
-            <a:off x="838199" y="1876328"/>
-            <a:ext cx="7835283" cy="613335"/>
-          </a:xfrm>
-        </p:spPr>
-        <p:txBody>
-          <a:bodyPr/>
-          <a:lstStyle/>
-          <a:p>
-            <a:r>
-              <a:rPr lang="en-US" dirty="0" smtClean="0">
-                <a:solidFill>
-                  <a:schemeClr val="bg1"/>
-                </a:solidFill>
-              </a:rPr>
-              <a:t>GIT </a:t>
-            </a:r>
-            <a:r>
-              <a:rPr lang="en-US" dirty="0" smtClean="0"/>
-              <a:t>workshop</a:t>
-            </a:r>
-            <a:r>
-              <a:rPr lang="pl-PL" dirty="0" smtClean="0"/>
-              <a:t>.</a:t>
-            </a:r>
-            <a:endParaRPr lang="en-US" dirty="0"/>
-          </a:p>
-        </p:txBody>
-      </p:sp>
-      <p:sp>
-        <p:nvSpPr>
-          <p:cNvPr id="3" name="Symbol zastępczy stopki 2"/>
-          <p:cNvSpPr>
-            <a:spLocks noGrp="1"/>
-          </p:cNvSpPr>
-          <p:nvPr>
-            <p:ph type="ftr" sz="quarter" idx="11"/>
-          </p:nvPr>
-        </p:nvSpPr>
-        <p:spPr>
-          <a:xfrm>
-            <a:off x="838198" y="4767263"/>
-            <a:ext cx="5700216" cy="273844"/>
-          </a:xfrm>
-        </p:spPr>
-        <p:txBody>
-          <a:bodyPr/>
-          <a:lstStyle/>
-          <a:p>
-            <a:r>
-              <a:rPr lang="en-US" dirty="0" smtClean="0"/>
-              <a:t>City, date</a:t>
-            </a:r>
-            <a:endParaRPr lang="en-US" dirty="0"/>
-          </a:p>
-        </p:txBody>
-      </p:sp>
-      <p:sp>
-        <p:nvSpPr>
-          <p:cNvPr id="4" name="Symbol zastępczy numeru slajdu 3"/>
-          <p:cNvSpPr>
-            <a:spLocks noGrp="1"/>
-          </p:cNvSpPr>
-          <p:nvPr>
-            <p:ph type="sldNum" sz="quarter" idx="12"/>
-          </p:nvPr>
-        </p:nvSpPr>
-        <p:spPr/>
-        <p:txBody>
-          <a:bodyPr/>
-          <a:lstStyle/>
-          <a:p>
-            <a:fld id="{9DC1E638-3F78-4E0D-883A-B278700C48C0}" type="slidenum">
-              <a:rPr lang="pl-PL" smtClean="0"/>
-              <a:pPr/>
-              <a:t>2</a:t>
-            </a:fld>
-            <a:endParaRPr lang="pl-PL" dirty="0"/>
-          </a:p>
-        </p:txBody>
-      </p:sp>
-      <p:sp>
-        <p:nvSpPr>
-          <p:cNvPr id="5" name="Symbol zastępczy tekstu 4"/>
-          <p:cNvSpPr>
-            <a:spLocks noGrp="1"/>
-          </p:cNvSpPr>
-          <p:nvPr>
-            <p:ph type="body" sz="quarter" idx="13"/>
-          </p:nvPr>
-        </p:nvSpPr>
-        <p:spPr>
-          <a:xfrm>
-            <a:off x="838199" y="3643313"/>
-            <a:ext cx="7829551" cy="314325"/>
-          </a:xfrm>
-        </p:spPr>
-        <p:txBody>
-          <a:bodyPr>
-            <a:normAutofit lnSpcReduction="10000"/>
-          </a:bodyPr>
-          <a:lstStyle/>
-          <a:p>
-            <a:r>
-              <a:rPr lang="en-US" dirty="0" smtClean="0"/>
-              <a:t>Distributed version control systems</a:t>
-            </a:r>
-            <a:endParaRPr lang="en-US" dirty="0"/>
-          </a:p>
-        </p:txBody>
-      </p:sp>
-    </p:spTree>
-    <p:extLst>
-      <p:ext uri="{BB962C8B-B14F-4D97-AF65-F5344CB8AC3E}">
-        <p14:creationId xmlns:p14="http://schemas.microsoft.com/office/powerpoint/2010/main" val="2613162352"/>
-      </p:ext>
-    </p:extLst>
-  </p:cSld>
-  <p:clrMapOvr>
-    <a:masterClrMapping/>
-  </p:clrMapOvr>
-  <mc:AlternateContent xmlns:mc="http://schemas.openxmlformats.org/markup-compatibility/2006" xmlns:p14="http://schemas.microsoft.com/office/powerpoint/2010/main">
-    <mc:Choice Requires="p14">
-      <p:transition spd="med" p14:dur="700">
-        <p:fade/>
-      </p:transition>
-    </mc:Choice>
-    <mc:Fallback xmlns="">
-      <p:transition spd="med">
-        <p:fade/>
-      </p:transition>
-    </mc:Fallback>
-  </mc:AlternateContent>
-  <p:timing>
-    <p:tnLst>
-      <p:par>
-        <p:cTn id="1" dur="indefinite" restart="never" nodeType="tmRoot"/>
-      </p:par>
-    </p:tnLst>
-  </p:timing>
-</p:sld>
-</file>
-
-<file path=ppt/slides/slide20.xml><?xml version="1.0" encoding="utf-8"?>
+<file path=ppt/slides/slide24.xml><?xml version="1.0" encoding="utf-8"?>
 <p:sld xmlns:a="http://schemas.openxmlformats.org/drawingml/2006/main" xmlns:r="http://schemas.openxmlformats.org/officeDocument/2006/relationships" xmlns:p="http://schemas.openxmlformats.org/presentationml/2006/main">
   <p:cSld>
     <p:spTree>
@@ -24402,55 +25024,12 @@
       </p:grpSpPr>
       <p:sp>
         <p:nvSpPr>
-          <p:cNvPr id="2" name="Slide Number Placeholder 1"/>
+          <p:cNvPr id="2" name="Symbol zastępczy tekstu 1"/>
           <p:cNvSpPr>
             <a:spLocks noGrp="1"/>
           </p:cNvSpPr>
           <p:nvPr>
-            <p:ph type="sldNum" sz="quarter" idx="12"/>
-          </p:nvPr>
-        </p:nvSpPr>
-        <p:spPr/>
-        <p:txBody>
-          <a:bodyPr/>
-          <a:lstStyle/>
-          <a:p>
-            <a:fld id="{9DC1E638-3F78-4E0D-883A-B278700C48C0}" type="slidenum">
-              <a:rPr lang="pl-PL" smtClean="0"/>
-              <a:pPr/>
-              <a:t>5</a:t>
-            </a:fld>
-            <a:endParaRPr lang="pl-PL"/>
-          </a:p>
-        </p:txBody>
-      </p:sp>
-      <p:sp>
-        <p:nvSpPr>
-          <p:cNvPr id="3" name="Text Placeholder 2"/>
-          <p:cNvSpPr>
-            <a:spLocks noGrp="1"/>
-          </p:cNvSpPr>
-          <p:nvPr>
-            <p:ph type="body" sz="quarter" idx="13"/>
-          </p:nvPr>
-        </p:nvSpPr>
-        <p:spPr/>
-        <p:txBody>
-          <a:bodyPr/>
-          <a:lstStyle/>
-          <a:p>
-            <a:endParaRPr lang="en-US"/>
-          </a:p>
-        </p:txBody>
-      </p:sp>
-      <p:sp>
-        <p:nvSpPr>
-          <p:cNvPr id="4" name="Title 3"/>
-          <p:cNvSpPr>
-            <a:spLocks noGrp="1"/>
-          </p:cNvSpPr>
-          <p:nvPr>
-            <p:ph type="title"/>
+            <p:ph type="body" sz="quarter" idx="10"/>
           </p:nvPr>
         </p:nvSpPr>
         <p:spPr/>
@@ -24459,103 +25038,29 @@
           <a:lstStyle/>
           <a:p>
             <a:r>
-              <a:rPr lang="en-US" dirty="0" smtClean="0"/>
-              <a:t>Bonus </a:t>
+              <a:rPr lang="sr-Latn-RS" sz="6600" dirty="0" smtClean="0"/>
+              <a:t>Git</a:t>
             </a:r>
             <a:r>
-              <a:rPr lang="en-US" dirty="0" err="1" smtClean="0"/>
-              <a:t>kako</a:t>
+              <a:rPr lang="pl-PL" sz="6600" dirty="0" smtClean="0">
+                <a:solidFill>
+                  <a:srgbClr val="000000"/>
+                </a:solidFill>
+              </a:rPr>
+              <a:t>Hello.</a:t>
             </a:r>
             <a:r>
-              <a:rPr lang="en-US" dirty="0" smtClean="0"/>
+              <a:rPr lang="en-US" sz="6600" dirty="0" smtClean="0"/>
               <a:t> </a:t>
             </a:r>
-            <a:r>
-              <a:rPr lang="en-US" dirty="0" err="1" smtClean="0"/>
-              <a:t>napisti</a:t>
-            </a:r>
-            <a:r>
-              <a:rPr lang="en-US" dirty="0" smtClean="0"/>
-              <a:t> </a:t>
-            </a:r>
-            <a:r>
-              <a:rPr lang="en-US" dirty="0" err="1" smtClean="0"/>
-              <a:t>dobru</a:t>
-            </a:r>
-            <a:r>
-              <a:rPr lang="en-US" dirty="0" smtClean="0"/>
-              <a:t> </a:t>
-            </a:r>
-            <a:r>
-              <a:rPr lang="en-US" dirty="0" err="1" smtClean="0"/>
-              <a:t>poruku</a:t>
-            </a:r>
-            <a:r>
-              <a:rPr lang="en-US" dirty="0" smtClean="0"/>
-              <a:t> </a:t>
-            </a:r>
-            <a:r>
-              <a:rPr lang="en-US" dirty="0" err="1" smtClean="0"/>
-              <a:t>za</a:t>
-            </a:r>
-            <a:r>
-              <a:rPr lang="en-US" dirty="0" smtClean="0"/>
-              <a:t> commit</a:t>
-            </a:r>
-            <a:endParaRPr lang="en-US" dirty="0"/>
-          </a:p>
-        </p:txBody>
-      </p:sp>
-      <p:sp>
-        <p:nvSpPr>
-          <p:cNvPr id="5" name="Text Placeholder 4"/>
-          <p:cNvSpPr>
-            <a:spLocks noGrp="1"/>
-          </p:cNvSpPr>
-          <p:nvPr>
-            <p:ph type="body" sz="quarter" idx="14"/>
-          </p:nvPr>
-        </p:nvSpPr>
-        <p:spPr/>
-        <p:txBody>
-          <a:bodyPr/>
-          <a:lstStyle/>
-          <a:p>
-            <a:r>
-              <a:rPr lang="en-US" dirty="0"/>
-              <a:t>Just like any other commit, make sure you explain why you’re making</a:t>
-            </a:r>
-          </a:p>
-          <a:p>
-            <a:r>
-              <a:rPr lang="en-US" dirty="0"/>
-              <a:t>this commit. Just marking that you’re reverting a change, like I did</a:t>
-            </a:r>
-          </a:p>
-          <a:p>
-            <a:r>
-              <a:rPr lang="en-US" dirty="0"/>
-              <a:t>here, doesn’t say much.</a:t>
-            </a:r>
-          </a:p>
-          <a:p>
-            <a:r>
-              <a:rPr lang="en-US" dirty="0"/>
-              <a:t>Did it not work? Was it too slow? Say that. You’ll thank yourself in six</a:t>
-            </a:r>
-          </a:p>
-          <a:p>
-            <a:r>
-              <a:rPr lang="en-US" dirty="0"/>
-              <a:t>months when you’re trying to remember why you reverted that change.</a:t>
-            </a:r>
+            <a:endParaRPr lang="en-US" sz="6600" dirty="0"/>
           </a:p>
         </p:txBody>
       </p:sp>
     </p:spTree>
     <p:extLst>
       <p:ext uri="{BB962C8B-B14F-4D97-AF65-F5344CB8AC3E}">
-        <p14:creationId xmlns:p14="http://schemas.microsoft.com/office/powerpoint/2010/main" val="3210735741"/>
+        <p14:creationId xmlns:p14="http://schemas.microsoft.com/office/powerpoint/2010/main" val="417511367"/>
       </p:ext>
     </p:extLst>
   </p:cSld>
@@ -24620,6 +25125,594 @@
               <a:rPr lang="pl-PL" smtClean="0"/>
               <a:pPr/>
               <a:t>6</a:t>
+            </a:fld>
+            <a:endParaRPr lang="pl-PL"/>
+          </a:p>
+        </p:txBody>
+      </p:sp>
+      <p:sp>
+        <p:nvSpPr>
+          <p:cNvPr id="3" name="Text Placeholder 2"/>
+          <p:cNvSpPr>
+            <a:spLocks noGrp="1"/>
+          </p:cNvSpPr>
+          <p:nvPr>
+            <p:ph type="body" sz="quarter" idx="13"/>
+          </p:nvPr>
+        </p:nvSpPr>
+        <p:spPr/>
+        <p:txBody>
+          <a:bodyPr/>
+          <a:lstStyle/>
+          <a:p>
+            <a:r>
+              <a:rPr lang="en-US" dirty="0" smtClean="0"/>
+              <a:t>TO DO – </a:t>
+            </a:r>
+            <a:r>
+              <a:rPr lang="en-US" dirty="0" err="1" smtClean="0"/>
+              <a:t>definicija</a:t>
+            </a:r>
+            <a:r>
+              <a:rPr lang="en-US" dirty="0" smtClean="0"/>
+              <a:t> Version control</a:t>
+            </a:r>
+            <a:endParaRPr lang="en-US" dirty="0"/>
+          </a:p>
+        </p:txBody>
+      </p:sp>
+      <p:sp>
+        <p:nvSpPr>
+          <p:cNvPr id="4" name="Title 3"/>
+          <p:cNvSpPr>
+            <a:spLocks noGrp="1"/>
+          </p:cNvSpPr>
+          <p:nvPr>
+            <p:ph type="title"/>
+          </p:nvPr>
+        </p:nvSpPr>
+        <p:spPr/>
+        <p:txBody>
+          <a:bodyPr/>
+          <a:lstStyle/>
+          <a:p>
+            <a:r>
+              <a:rPr lang="sr-Latn-RS" dirty="0" smtClean="0"/>
+              <a:t>Version Control the Git Way</a:t>
+            </a:r>
+            <a:endParaRPr lang="en-US" dirty="0"/>
+          </a:p>
+        </p:txBody>
+      </p:sp>
+      <p:sp>
+        <p:nvSpPr>
+          <p:cNvPr id="5" name="Text Placeholder 4"/>
+          <p:cNvSpPr>
+            <a:spLocks noGrp="1"/>
+          </p:cNvSpPr>
+          <p:nvPr>
+            <p:ph type="body" sz="quarter" idx="14"/>
+          </p:nvPr>
+        </p:nvSpPr>
+        <p:spPr/>
+        <p:txBody>
+          <a:bodyPr/>
+          <a:lstStyle/>
+          <a:p>
+            <a:r>
+              <a:rPr lang="en-US" dirty="0" err="1" smtClean="0"/>
+              <a:t>Razlika</a:t>
+            </a:r>
+            <a:r>
+              <a:rPr lang="en-US" dirty="0" smtClean="0"/>
+              <a:t> </a:t>
+            </a:r>
+            <a:r>
+              <a:rPr lang="en-US" dirty="0" err="1" smtClean="0"/>
+              <a:t>izmedju</a:t>
+            </a:r>
+            <a:r>
+              <a:rPr lang="en-US" dirty="0" smtClean="0"/>
+              <a:t> CSV </a:t>
+            </a:r>
+            <a:r>
+              <a:rPr lang="en-US" dirty="0" err="1" smtClean="0"/>
+              <a:t>i</a:t>
+            </a:r>
+            <a:r>
+              <a:rPr lang="en-US" dirty="0" smtClean="0"/>
+              <a:t> DVCS</a:t>
+            </a:r>
+            <a:endParaRPr lang="en-US" dirty="0"/>
+          </a:p>
+        </p:txBody>
+      </p:sp>
+    </p:spTree>
+    <p:extLst>
+      <p:ext uri="{BB962C8B-B14F-4D97-AF65-F5344CB8AC3E}">
+        <p14:creationId xmlns:p14="http://schemas.microsoft.com/office/powerpoint/2010/main" val="3692174784"/>
+      </p:ext>
+    </p:extLst>
+  </p:cSld>
+  <p:clrMapOvr>
+    <a:masterClrMapping/>
+  </p:clrMapOvr>
+  <mc:AlternateContent xmlns:mc="http://schemas.openxmlformats.org/markup-compatibility/2006" xmlns:p14="http://schemas.microsoft.com/office/powerpoint/2010/main">
+    <mc:Choice Requires="p14">
+      <p:transition spd="med" p14:dur="700">
+        <p:fade/>
+      </p:transition>
+    </mc:Choice>
+    <mc:Fallback xmlns="">
+      <p:transition spd="med">
+        <p:fade/>
+      </p:transition>
+    </mc:Fallback>
+  </mc:AlternateContent>
+  <p:timing>
+    <p:tnLst>
+      <p:par>
+        <p:cTn id="1" dur="indefinite" restart="never" nodeType="tmRoot"/>
+      </p:par>
+    </p:tnLst>
+  </p:timing>
+</p:sld>
+</file>
+
+<file path=ppt/slides/slide7.xml><?xml version="1.0" encoding="utf-8"?>
+<p:sld xmlns:a="http://schemas.openxmlformats.org/drawingml/2006/main" xmlns:r="http://schemas.openxmlformats.org/officeDocument/2006/relationships" xmlns:p="http://schemas.openxmlformats.org/presentationml/2006/main">
+  <p:cSld>
+    <p:spTree>
+      <p:nvGrpSpPr>
+        <p:cNvPr id="1" name=""/>
+        <p:cNvGrpSpPr/>
+        <p:nvPr/>
+      </p:nvGrpSpPr>
+      <p:grpSpPr>
+        <a:xfrm>
+          <a:off x="0" y="0"/>
+          <a:ext cx="0" cy="0"/>
+          <a:chOff x="0" y="0"/>
+          <a:chExt cx="0" cy="0"/>
+        </a:xfrm>
+      </p:grpSpPr>
+      <p:sp>
+        <p:nvSpPr>
+          <p:cNvPr id="2" name="Slide Number Placeholder 1"/>
+          <p:cNvSpPr>
+            <a:spLocks noGrp="1"/>
+          </p:cNvSpPr>
+          <p:nvPr>
+            <p:ph type="sldNum" sz="quarter" idx="12"/>
+          </p:nvPr>
+        </p:nvSpPr>
+        <p:spPr/>
+        <p:txBody>
+          <a:bodyPr/>
+          <a:lstStyle/>
+          <a:p>
+            <a:fld id="{9DC1E638-3F78-4E0D-883A-B278700C48C0}" type="slidenum">
+              <a:rPr lang="pl-PL" smtClean="0"/>
+              <a:pPr/>
+              <a:t>7</a:t>
+            </a:fld>
+            <a:endParaRPr lang="pl-PL"/>
+          </a:p>
+        </p:txBody>
+      </p:sp>
+      <p:sp>
+        <p:nvSpPr>
+          <p:cNvPr id="3" name="Text Placeholder 2"/>
+          <p:cNvSpPr>
+            <a:spLocks noGrp="1"/>
+          </p:cNvSpPr>
+          <p:nvPr>
+            <p:ph type="body" sz="quarter" idx="13"/>
+          </p:nvPr>
+        </p:nvSpPr>
+        <p:spPr/>
+        <p:txBody>
+          <a:bodyPr/>
+          <a:lstStyle/>
+          <a:p>
+            <a:r>
+              <a:rPr lang="sr-Latn-RS" dirty="0" smtClean="0"/>
+              <a:t>Git install</a:t>
+            </a:r>
+            <a:endParaRPr lang="en-US" dirty="0"/>
+          </a:p>
+        </p:txBody>
+      </p:sp>
+      <p:sp>
+        <p:nvSpPr>
+          <p:cNvPr id="4" name="Title 3"/>
+          <p:cNvSpPr>
+            <a:spLocks noGrp="1"/>
+          </p:cNvSpPr>
+          <p:nvPr>
+            <p:ph type="title"/>
+          </p:nvPr>
+        </p:nvSpPr>
+        <p:spPr/>
+        <p:txBody>
+          <a:bodyPr/>
+          <a:lstStyle/>
+          <a:p>
+            <a:r>
+              <a:rPr lang="sr-Latn-RS" dirty="0" smtClean="0"/>
+              <a:t>As simple as that</a:t>
+            </a:r>
+            <a:endParaRPr lang="en-US" dirty="0"/>
+          </a:p>
+        </p:txBody>
+      </p:sp>
+      <p:sp>
+        <p:nvSpPr>
+          <p:cNvPr id="5" name="Text Placeholder 4"/>
+          <p:cNvSpPr>
+            <a:spLocks noGrp="1"/>
+          </p:cNvSpPr>
+          <p:nvPr>
+            <p:ph type="body" sz="quarter" idx="14"/>
+          </p:nvPr>
+        </p:nvSpPr>
+        <p:spPr/>
+        <p:txBody>
+          <a:bodyPr/>
+          <a:lstStyle/>
+          <a:p>
+            <a:r>
+              <a:rPr lang="en-US" dirty="0" err="1" smtClean="0"/>
+              <a:t>Git</a:t>
+            </a:r>
+            <a:r>
+              <a:rPr lang="en-US" dirty="0" smtClean="0"/>
+              <a:t> je program </a:t>
+            </a:r>
+            <a:r>
+              <a:rPr lang="en-US" dirty="0" err="1" smtClean="0"/>
+              <a:t>koji</a:t>
+            </a:r>
+            <a:r>
+              <a:rPr lang="en-US" dirty="0" smtClean="0"/>
+              <a:t> </a:t>
+            </a:r>
+            <a:r>
+              <a:rPr lang="en-US" dirty="0" err="1" smtClean="0"/>
+              <a:t>mo</a:t>
+            </a:r>
+            <a:r>
+              <a:rPr lang="sr-Latn-RS" dirty="0" smtClean="0"/>
+              <a:t>žemo preuzeti sa sledećeg </a:t>
+            </a:r>
+            <a:r>
+              <a:rPr lang="sr-Latn-RS" dirty="0"/>
+              <a:t>sajta </a:t>
+            </a:r>
+            <a:r>
+              <a:rPr lang="sr-Latn-RS" dirty="0">
+                <a:hlinkClick r:id="rId2"/>
+              </a:rPr>
+              <a:t>https://git-scm.com</a:t>
+            </a:r>
+            <a:r>
+              <a:rPr lang="sr-Latn-RS" dirty="0" smtClean="0">
+                <a:hlinkClick r:id="rId2"/>
+              </a:rPr>
+              <a:t>/</a:t>
+            </a:r>
+            <a:endParaRPr lang="sr-Latn-RS" dirty="0" smtClean="0"/>
+          </a:p>
+          <a:p>
+            <a:r>
+              <a:rPr lang="en-US" dirty="0" smtClean="0"/>
+              <a:t>prompt&gt;</a:t>
+            </a:r>
+            <a:r>
+              <a:rPr lang="en-US" dirty="0" err="1" smtClean="0"/>
+              <a:t>git</a:t>
+            </a:r>
+            <a:r>
+              <a:rPr lang="en-US" dirty="0" smtClean="0"/>
+              <a:t> </a:t>
+            </a:r>
+            <a:r>
+              <a:rPr lang="sr-Latn-RS" dirty="0" smtClean="0"/>
+              <a:t>--</a:t>
+            </a:r>
+            <a:r>
+              <a:rPr lang="en-US" dirty="0" smtClean="0"/>
+              <a:t>version</a:t>
+            </a:r>
+            <a:endParaRPr lang="sr-Latn-RS" dirty="0" smtClean="0"/>
+          </a:p>
+          <a:p>
+            <a:endParaRPr lang="sr-Latn-RS" dirty="0" smtClean="0"/>
+          </a:p>
+        </p:txBody>
+      </p:sp>
+      <p:pic>
+        <p:nvPicPr>
+          <p:cNvPr id="6" name="Picture 5"/>
+          <p:cNvPicPr>
+            <a:picLocks noChangeAspect="1"/>
+          </p:cNvPicPr>
+          <p:nvPr/>
+        </p:nvPicPr>
+        <p:blipFill>
+          <a:blip r:embed="rId3">
+            <a:extLst>
+              <a:ext uri="{28A0092B-C50C-407E-A947-70E740481C1C}">
+                <a14:useLocalDpi xmlns:a14="http://schemas.microsoft.com/office/drawing/2010/main" val="0"/>
+              </a:ext>
+            </a:extLst>
+          </a:blip>
+          <a:stretch>
+            <a:fillRect/>
+          </a:stretch>
+        </p:blipFill>
+        <p:spPr>
+          <a:xfrm>
+            <a:off x="394970" y="2665538"/>
+            <a:ext cx="3724795" cy="333422"/>
+          </a:xfrm>
+          <a:prstGeom prst="rect">
+            <a:avLst/>
+          </a:prstGeom>
+        </p:spPr>
+      </p:pic>
+    </p:spTree>
+    <p:extLst>
+      <p:ext uri="{BB962C8B-B14F-4D97-AF65-F5344CB8AC3E}">
+        <p14:creationId xmlns:p14="http://schemas.microsoft.com/office/powerpoint/2010/main" val="3029794499"/>
+      </p:ext>
+    </p:extLst>
+  </p:cSld>
+  <p:clrMapOvr>
+    <a:masterClrMapping/>
+  </p:clrMapOvr>
+  <mc:AlternateContent xmlns:mc="http://schemas.openxmlformats.org/markup-compatibility/2006" xmlns:p14="http://schemas.microsoft.com/office/powerpoint/2010/main">
+    <mc:Choice Requires="p14">
+      <p:transition spd="med" p14:dur="700">
+        <p:fade/>
+      </p:transition>
+    </mc:Choice>
+    <mc:Fallback xmlns="">
+      <p:transition spd="med">
+        <p:fade/>
+      </p:transition>
+    </mc:Fallback>
+  </mc:AlternateContent>
+  <p:timing>
+    <p:tnLst>
+      <p:par>
+        <p:cTn id="1" dur="indefinite" restart="never" nodeType="tmRoot"/>
+      </p:par>
+    </p:tnLst>
+  </p:timing>
+</p:sld>
+</file>
+
+<file path=ppt/slides/slide8.xml><?xml version="1.0" encoding="utf-8"?>
+<p:sld xmlns:a="http://schemas.openxmlformats.org/drawingml/2006/main" xmlns:r="http://schemas.openxmlformats.org/officeDocument/2006/relationships" xmlns:p="http://schemas.openxmlformats.org/presentationml/2006/main">
+  <p:cSld>
+    <p:spTree>
+      <p:nvGrpSpPr>
+        <p:cNvPr id="1" name=""/>
+        <p:cNvGrpSpPr/>
+        <p:nvPr/>
+      </p:nvGrpSpPr>
+      <p:grpSpPr>
+        <a:xfrm>
+          <a:off x="0" y="0"/>
+          <a:ext cx="0" cy="0"/>
+          <a:chOff x="0" y="0"/>
+          <a:chExt cx="0" cy="0"/>
+        </a:xfrm>
+      </p:grpSpPr>
+      <p:sp>
+        <p:nvSpPr>
+          <p:cNvPr id="2" name="Slide Number Placeholder 1"/>
+          <p:cNvSpPr>
+            <a:spLocks noGrp="1"/>
+          </p:cNvSpPr>
+          <p:nvPr>
+            <p:ph type="sldNum" sz="quarter" idx="12"/>
+          </p:nvPr>
+        </p:nvSpPr>
+        <p:spPr/>
+        <p:txBody>
+          <a:bodyPr/>
+          <a:lstStyle/>
+          <a:p>
+            <a:fld id="{9DC1E638-3F78-4E0D-883A-B278700C48C0}" type="slidenum">
+              <a:rPr lang="pl-PL" smtClean="0"/>
+              <a:pPr/>
+              <a:t>8</a:t>
+            </a:fld>
+            <a:endParaRPr lang="pl-PL"/>
+          </a:p>
+        </p:txBody>
+      </p:sp>
+      <p:sp>
+        <p:nvSpPr>
+          <p:cNvPr id="3" name="Text Placeholder 2"/>
+          <p:cNvSpPr>
+            <a:spLocks noGrp="1"/>
+          </p:cNvSpPr>
+          <p:nvPr>
+            <p:ph type="body" sz="quarter" idx="13"/>
+          </p:nvPr>
+        </p:nvSpPr>
+        <p:spPr/>
+        <p:txBody>
+          <a:bodyPr/>
+          <a:lstStyle/>
+          <a:p>
+            <a:endParaRPr lang="en-US"/>
+          </a:p>
+        </p:txBody>
+      </p:sp>
+      <p:sp>
+        <p:nvSpPr>
+          <p:cNvPr id="4" name="Title 3"/>
+          <p:cNvSpPr>
+            <a:spLocks noGrp="1"/>
+          </p:cNvSpPr>
+          <p:nvPr>
+            <p:ph type="title"/>
+          </p:nvPr>
+        </p:nvSpPr>
+        <p:spPr/>
+        <p:txBody>
+          <a:bodyPr/>
+          <a:lstStyle/>
+          <a:p>
+            <a:r>
+              <a:rPr lang="sr-Latn-RS" dirty="0" smtClean="0"/>
+              <a:t>Git repository</a:t>
+            </a:r>
+            <a:endParaRPr lang="en-US" dirty="0"/>
+          </a:p>
+        </p:txBody>
+      </p:sp>
+      <p:sp>
+        <p:nvSpPr>
+          <p:cNvPr id="5" name="Text Placeholder 4"/>
+          <p:cNvSpPr>
+            <a:spLocks noGrp="1"/>
+          </p:cNvSpPr>
+          <p:nvPr>
+            <p:ph type="body" sz="quarter" idx="14"/>
+          </p:nvPr>
+        </p:nvSpPr>
+        <p:spPr/>
+        <p:txBody>
+          <a:bodyPr/>
+          <a:lstStyle/>
+          <a:p>
+            <a:r>
+              <a:rPr lang="en-US" dirty="0" err="1" smtClean="0"/>
+              <a:t>Repozitorijum</a:t>
+            </a:r>
+            <a:r>
+              <a:rPr lang="en-US" dirty="0" smtClean="0"/>
+              <a:t> je </a:t>
+            </a:r>
+            <a:r>
+              <a:rPr lang="en-US" dirty="0" err="1" smtClean="0"/>
+              <a:t>mesto</a:t>
+            </a:r>
+            <a:r>
+              <a:rPr lang="en-US" dirty="0" smtClean="0"/>
+              <a:t> </a:t>
+            </a:r>
+            <a:r>
+              <a:rPr lang="en-US" dirty="0" err="1" smtClean="0"/>
+              <a:t>gde</a:t>
+            </a:r>
+            <a:r>
+              <a:rPr lang="en-US" dirty="0"/>
+              <a:t> </a:t>
+            </a:r>
+            <a:r>
+              <a:rPr lang="en-US" dirty="0" smtClean="0"/>
+              <a:t>CSV </a:t>
+            </a:r>
+            <a:r>
+              <a:rPr lang="en-US" dirty="0" err="1" smtClean="0"/>
+              <a:t>alati</a:t>
+            </a:r>
+            <a:r>
+              <a:rPr lang="en-US" dirty="0" smtClean="0"/>
+              <a:t> </a:t>
+            </a:r>
+            <a:r>
+              <a:rPr lang="sr-Latn-RS" dirty="0" smtClean="0"/>
+              <a:t>čuvaju sve promene koje napravimo.</a:t>
+            </a:r>
+          </a:p>
+          <a:p>
+            <a:r>
+              <a:rPr lang="sr-Latn-RS" dirty="0" smtClean="0"/>
+              <a:t>Pored poslednje verzije našeg koda dodaju se informacije ko je i kad napravio izmenu i tekstualna poruka zašto je izmena napravljena.</a:t>
+            </a:r>
+            <a:r>
+              <a:rPr lang="en-US" dirty="0" smtClean="0"/>
+              <a:t> </a:t>
+            </a:r>
+            <a:endParaRPr lang="en-US" dirty="0"/>
+          </a:p>
+        </p:txBody>
+      </p:sp>
+    </p:spTree>
+    <p:extLst>
+      <p:ext uri="{BB962C8B-B14F-4D97-AF65-F5344CB8AC3E}">
+        <p14:creationId xmlns:p14="http://schemas.microsoft.com/office/powerpoint/2010/main" val="4204138379"/>
+      </p:ext>
+    </p:extLst>
+  </p:cSld>
+  <p:clrMapOvr>
+    <a:masterClrMapping/>
+  </p:clrMapOvr>
+  <mc:AlternateContent xmlns:mc="http://schemas.openxmlformats.org/markup-compatibility/2006" xmlns:p14="http://schemas.microsoft.com/office/powerpoint/2010/main">
+    <mc:Choice Requires="p14">
+      <p:transition spd="med" p14:dur="700">
+        <p:fade/>
+      </p:transition>
+    </mc:Choice>
+    <mc:Fallback xmlns="">
+      <p:transition spd="med">
+        <p:fade/>
+      </p:transition>
+    </mc:Fallback>
+  </mc:AlternateContent>
+  <p:timing>
+    <p:tnLst>
+      <p:par>
+        <p:cTn id="1" dur="indefinite" restart="never" nodeType="tmRoot"/>
+      </p:par>
+    </p:tnLst>
+  </p:timing>
+</p:sld>
+</file>
+
+<file path=ppt/slides/slide9.xml><?xml version="1.0" encoding="utf-8"?>
+<p:sld xmlns:a="http://schemas.openxmlformats.org/drawingml/2006/main" xmlns:r="http://schemas.openxmlformats.org/officeDocument/2006/relationships" xmlns:p="http://schemas.openxmlformats.org/presentationml/2006/main">
+  <p:cSld>
+    <p:spTree>
+      <p:nvGrpSpPr>
+        <p:cNvPr id="1" name=""/>
+        <p:cNvGrpSpPr/>
+        <p:nvPr/>
+      </p:nvGrpSpPr>
+      <p:grpSpPr>
+        <a:xfrm>
+          <a:off x="0" y="0"/>
+          <a:ext cx="0" cy="0"/>
+          <a:chOff x="0" y="0"/>
+          <a:chExt cx="0" cy="0"/>
+        </a:xfrm>
+      </p:grpSpPr>
+      <p:sp>
+        <p:nvSpPr>
+          <p:cNvPr id="2" name="Slide Number Placeholder 1"/>
+          <p:cNvSpPr>
+            <a:spLocks noGrp="1"/>
+          </p:cNvSpPr>
+          <p:nvPr>
+            <p:ph type="sldNum" sz="quarter" idx="12"/>
+          </p:nvPr>
+        </p:nvSpPr>
+        <p:spPr/>
+        <p:txBody>
+          <a:bodyPr/>
+          <a:lstStyle/>
+          <a:p>
+            <a:fld id="{9DC1E638-3F78-4E0D-883A-B278700C48C0}" type="slidenum">
+              <a:rPr lang="pl-PL" smtClean="0"/>
+              <a:pPr/>
+              <a:t>9</a:t>
             </a:fld>
             <a:endParaRPr lang="pl-PL"/>
           </a:p>
@@ -24744,376 +25837,7 @@
     </p:spTree>
     <p:extLst>
       <p:ext uri="{BB962C8B-B14F-4D97-AF65-F5344CB8AC3E}">
-        <p14:creationId xmlns:p14="http://schemas.microsoft.com/office/powerpoint/2010/main" val="3692174784"/>
-      </p:ext>
-    </p:extLst>
-  </p:cSld>
-  <p:clrMapOvr>
-    <a:masterClrMapping/>
-  </p:clrMapOvr>
-  <mc:AlternateContent xmlns:mc="http://schemas.openxmlformats.org/markup-compatibility/2006" xmlns:p14="http://schemas.microsoft.com/office/powerpoint/2010/main">
-    <mc:Choice Requires="p14">
-      <p:transition spd="med" p14:dur="700">
-        <p:fade/>
-      </p:transition>
-    </mc:Choice>
-    <mc:Fallback xmlns="">
-      <p:transition spd="med">
-        <p:fade/>
-      </p:transition>
-    </mc:Fallback>
-  </mc:AlternateContent>
-  <p:timing>
-    <p:tnLst>
-      <p:par>
-        <p:cTn id="1" dur="indefinite" restart="never" nodeType="tmRoot"/>
-      </p:par>
-    </p:tnLst>
-  </p:timing>
-</p:sld>
-</file>
-
-<file path=ppt/slides/slide7.xml><?xml version="1.0" encoding="utf-8"?>
-<p:sld xmlns:a="http://schemas.openxmlformats.org/drawingml/2006/main" xmlns:r="http://schemas.openxmlformats.org/officeDocument/2006/relationships" xmlns:p="http://schemas.openxmlformats.org/presentationml/2006/main">
-  <p:cSld>
-    <p:spTree>
-      <p:nvGrpSpPr>
-        <p:cNvPr id="1" name=""/>
-        <p:cNvGrpSpPr/>
-        <p:nvPr/>
-      </p:nvGrpSpPr>
-      <p:grpSpPr>
-        <a:xfrm>
-          <a:off x="0" y="0"/>
-          <a:ext cx="0" cy="0"/>
-          <a:chOff x="0" y="0"/>
-          <a:chExt cx="0" cy="0"/>
-        </a:xfrm>
-      </p:grpSpPr>
-      <p:sp>
-        <p:nvSpPr>
-          <p:cNvPr id="2" name="Slide Number Placeholder 1"/>
-          <p:cNvSpPr>
-            <a:spLocks noGrp="1"/>
-          </p:cNvSpPr>
-          <p:nvPr>
-            <p:ph type="sldNum" sz="quarter" idx="12"/>
-          </p:nvPr>
-        </p:nvSpPr>
-        <p:spPr/>
-        <p:txBody>
-          <a:bodyPr/>
-          <a:lstStyle/>
-          <a:p>
-            <a:fld id="{9DC1E638-3F78-4E0D-883A-B278700C48C0}" type="slidenum">
-              <a:rPr lang="pl-PL" smtClean="0"/>
-              <a:pPr/>
-              <a:t>7</a:t>
-            </a:fld>
-            <a:endParaRPr lang="pl-PL"/>
-          </a:p>
-        </p:txBody>
-      </p:sp>
-      <p:sp>
-        <p:nvSpPr>
-          <p:cNvPr id="3" name="Text Placeholder 2"/>
-          <p:cNvSpPr>
-            <a:spLocks noGrp="1"/>
-          </p:cNvSpPr>
-          <p:nvPr>
-            <p:ph type="body" sz="quarter" idx="13"/>
-          </p:nvPr>
-        </p:nvSpPr>
-        <p:spPr/>
-        <p:txBody>
-          <a:bodyPr/>
-          <a:lstStyle/>
-          <a:p>
-            <a:endParaRPr lang="en-US"/>
-          </a:p>
-        </p:txBody>
-      </p:sp>
-      <p:sp>
-        <p:nvSpPr>
-          <p:cNvPr id="4" name="Title 3"/>
-          <p:cNvSpPr>
-            <a:spLocks noGrp="1"/>
-          </p:cNvSpPr>
-          <p:nvPr>
-            <p:ph type="title"/>
-          </p:nvPr>
-        </p:nvSpPr>
-        <p:spPr/>
-        <p:txBody>
-          <a:bodyPr/>
-          <a:lstStyle/>
-          <a:p>
-            <a:r>
-              <a:rPr lang="en-US" dirty="0" smtClean="0"/>
-              <a:t>GIT ISPRAVNA IMENA</a:t>
-            </a:r>
-            <a:endParaRPr lang="en-US" dirty="0"/>
-          </a:p>
-        </p:txBody>
-      </p:sp>
-      <p:sp>
-        <p:nvSpPr>
-          <p:cNvPr id="5" name="Text Placeholder 4"/>
-          <p:cNvSpPr>
-            <a:spLocks noGrp="1"/>
-          </p:cNvSpPr>
-          <p:nvPr>
-            <p:ph type="body" sz="quarter" idx="14"/>
-          </p:nvPr>
-        </p:nvSpPr>
-        <p:spPr/>
-        <p:txBody>
-          <a:bodyPr/>
-          <a:lstStyle/>
-          <a:p>
-            <a:r>
-              <a:rPr lang="en-US" dirty="0"/>
-              <a:t>Valid naming is discussed in Section 8.3, Using</a:t>
-            </a:r>
-          </a:p>
-          <a:p>
-            <a:r>
-              <a:rPr lang="en-US" dirty="0"/>
-              <a:t>Valid Names for Tags and Branches, on page 114</a:t>
-            </a:r>
-            <a:endParaRPr lang="en-US" dirty="0"/>
-          </a:p>
-        </p:txBody>
-      </p:sp>
-    </p:spTree>
-    <p:extLst>
-      <p:ext uri="{BB962C8B-B14F-4D97-AF65-F5344CB8AC3E}">
-        <p14:creationId xmlns:p14="http://schemas.microsoft.com/office/powerpoint/2010/main" val="3953076804"/>
-      </p:ext>
-    </p:extLst>
-  </p:cSld>
-  <p:clrMapOvr>
-    <a:masterClrMapping/>
-  </p:clrMapOvr>
-  <mc:AlternateContent xmlns:mc="http://schemas.openxmlformats.org/markup-compatibility/2006" xmlns:p14="http://schemas.microsoft.com/office/powerpoint/2010/main">
-    <mc:Choice Requires="p14">
-      <p:transition spd="med" p14:dur="700">
-        <p:fade/>
-      </p:transition>
-    </mc:Choice>
-    <mc:Fallback xmlns="">
-      <p:transition spd="med">
-        <p:fade/>
-      </p:transition>
-    </mc:Fallback>
-  </mc:AlternateContent>
-  <p:timing>
-    <p:tnLst>
-      <p:par>
-        <p:cTn id="1" dur="indefinite" restart="never" nodeType="tmRoot"/>
-      </p:par>
-    </p:tnLst>
-  </p:timing>
-</p:sld>
-</file>
-
-<file path=ppt/slides/slide8.xml><?xml version="1.0" encoding="utf-8"?>
-<p:sld xmlns:a="http://schemas.openxmlformats.org/drawingml/2006/main" xmlns:r="http://schemas.openxmlformats.org/officeDocument/2006/relationships" xmlns:p="http://schemas.openxmlformats.org/presentationml/2006/main">
-  <p:cSld>
-    <p:spTree>
-      <p:nvGrpSpPr>
-        <p:cNvPr id="1" name=""/>
-        <p:cNvGrpSpPr/>
-        <p:nvPr/>
-      </p:nvGrpSpPr>
-      <p:grpSpPr>
-        <a:xfrm>
-          <a:off x="0" y="0"/>
-          <a:ext cx="0" cy="0"/>
-          <a:chOff x="0" y="0"/>
-          <a:chExt cx="0" cy="0"/>
-        </a:xfrm>
-      </p:grpSpPr>
-      <p:sp>
-        <p:nvSpPr>
-          <p:cNvPr id="2" name="Symbol zastępczy tekstu 1"/>
-          <p:cNvSpPr>
-            <a:spLocks noGrp="1"/>
-          </p:cNvSpPr>
-          <p:nvPr>
-            <p:ph type="body" sz="quarter" idx="10"/>
-          </p:nvPr>
-        </p:nvSpPr>
-        <p:spPr/>
-        <p:txBody>
-          <a:bodyPr/>
-          <a:lstStyle/>
-          <a:p>
-            <a:r>
-              <a:rPr lang="en-US" sz="6600" dirty="0" smtClean="0"/>
-              <a:t>Smart</a:t>
-            </a:r>
-            <a:r>
-              <a:rPr lang="en-US" sz="6600" dirty="0" smtClean="0">
-                <a:solidFill>
-                  <a:srgbClr val="000000"/>
-                </a:solidFill>
-              </a:rPr>
-              <a:t>Art</a:t>
-            </a:r>
-            <a:r>
-              <a:rPr lang="pl-PL" sz="6600" dirty="0" smtClean="0">
-                <a:solidFill>
-                  <a:srgbClr val="000000"/>
-                </a:solidFill>
-              </a:rPr>
-              <a:t>.</a:t>
-            </a:r>
-            <a:r>
-              <a:rPr lang="en-US" sz="6600" dirty="0" smtClean="0"/>
-              <a:t> </a:t>
-            </a:r>
-            <a:endParaRPr lang="en-US" sz="6600" dirty="0"/>
-          </a:p>
-        </p:txBody>
-      </p:sp>
-    </p:spTree>
-    <p:extLst>
-      <p:ext uri="{BB962C8B-B14F-4D97-AF65-F5344CB8AC3E}">
-        <p14:creationId xmlns:p14="http://schemas.microsoft.com/office/powerpoint/2010/main" val="417511367"/>
-      </p:ext>
-    </p:extLst>
-  </p:cSld>
-  <p:clrMapOvr>
-    <a:masterClrMapping/>
-  </p:clrMapOvr>
-  <mc:AlternateContent xmlns:mc="http://schemas.openxmlformats.org/markup-compatibility/2006" xmlns:p14="http://schemas.microsoft.com/office/powerpoint/2010/main">
-    <mc:Choice Requires="p14">
-      <p:transition spd="med" p14:dur="700">
-        <p:fade/>
-      </p:transition>
-    </mc:Choice>
-    <mc:Fallback xmlns="">
-      <p:transition spd="med">
-        <p:fade/>
-      </p:transition>
-    </mc:Fallback>
-  </mc:AlternateContent>
-  <p:timing>
-    <p:tnLst>
-      <p:par>
-        <p:cTn id="1" dur="indefinite" restart="never" nodeType="tmRoot"/>
-      </p:par>
-    </p:tnLst>
-  </p:timing>
-</p:sld>
-</file>
-
-<file path=ppt/slides/slide9.xml><?xml version="1.0" encoding="utf-8"?>
-<p:sld xmlns:a="http://schemas.openxmlformats.org/drawingml/2006/main" xmlns:r="http://schemas.openxmlformats.org/officeDocument/2006/relationships" xmlns:p="http://schemas.openxmlformats.org/presentationml/2006/main">
-  <p:cSld>
-    <p:spTree>
-      <p:nvGrpSpPr>
-        <p:cNvPr id="1" name=""/>
-        <p:cNvGrpSpPr/>
-        <p:nvPr/>
-      </p:nvGrpSpPr>
-      <p:grpSpPr>
-        <a:xfrm>
-          <a:off x="0" y="0"/>
-          <a:ext cx="0" cy="0"/>
-          <a:chOff x="0" y="0"/>
-          <a:chExt cx="0" cy="0"/>
-        </a:xfrm>
-      </p:grpSpPr>
-      <p:sp>
-        <p:nvSpPr>
-          <p:cNvPr id="2" name="Symbol zastępczy numeru slajdu 1"/>
-          <p:cNvSpPr>
-            <a:spLocks noGrp="1"/>
-          </p:cNvSpPr>
-          <p:nvPr>
-            <p:ph type="sldNum" sz="quarter" idx="12"/>
-          </p:nvPr>
-        </p:nvSpPr>
-        <p:spPr/>
-        <p:txBody>
-          <a:bodyPr/>
-          <a:lstStyle/>
-          <a:p>
-            <a:fld id="{9DC1E638-3F78-4E0D-883A-B278700C48C0}" type="slidenum">
-              <a:rPr lang="pl-PL" smtClean="0"/>
-              <a:pPr/>
-              <a:t>9</a:t>
-            </a:fld>
-            <a:endParaRPr lang="pl-PL"/>
-          </a:p>
-        </p:txBody>
-      </p:sp>
-      <p:sp>
-        <p:nvSpPr>
-          <p:cNvPr id="3" name="Symbol zastępczy tekstu 2"/>
-          <p:cNvSpPr>
-            <a:spLocks noGrp="1"/>
-          </p:cNvSpPr>
-          <p:nvPr>
-            <p:ph type="body" sz="quarter" idx="13"/>
-          </p:nvPr>
-        </p:nvSpPr>
-        <p:spPr/>
-        <p:txBody>
-          <a:bodyPr/>
-          <a:lstStyle/>
-          <a:p>
-            <a:r>
-              <a:rPr lang="sr-Latn-RS" dirty="0" smtClean="0"/>
-              <a:t>Šta je branch?</a:t>
-            </a:r>
-          </a:p>
-          <a:p>
-            <a:r>
-              <a:rPr lang="sr-Latn-RS" dirty="0" smtClean="0"/>
-              <a:t>Merge branches?</a:t>
-            </a:r>
-          </a:p>
-          <a:p>
-            <a:r>
-              <a:rPr lang="sr-Latn-RS" smtClean="0"/>
-              <a:t>Strategije spajanja branchova?</a:t>
-            </a:r>
-            <a:endParaRPr lang="sr-Latn-RS" dirty="0" smtClean="0"/>
-          </a:p>
-          <a:p>
-            <a:endParaRPr lang="en-US" dirty="0"/>
-          </a:p>
-        </p:txBody>
-      </p:sp>
-      <p:sp>
-        <p:nvSpPr>
-          <p:cNvPr id="4" name="Tytuł 3"/>
-          <p:cNvSpPr>
-            <a:spLocks noGrp="1"/>
-          </p:cNvSpPr>
-          <p:nvPr>
-            <p:ph type="title"/>
-          </p:nvPr>
-        </p:nvSpPr>
-        <p:spPr/>
-        <p:txBody>
-          <a:bodyPr/>
-          <a:lstStyle/>
-          <a:p>
-            <a:r>
-              <a:rPr lang="en-US" dirty="0"/>
-              <a:t>Branches</a:t>
-            </a:r>
-          </a:p>
-        </p:txBody>
-      </p:sp>
-    </p:spTree>
-    <p:extLst>
-      <p:ext uri="{BB962C8B-B14F-4D97-AF65-F5344CB8AC3E}">
-        <p14:creationId xmlns:p14="http://schemas.microsoft.com/office/powerpoint/2010/main" val="764560161"/>
+        <p14:creationId xmlns:p14="http://schemas.microsoft.com/office/powerpoint/2010/main" val="1747889741"/>
       </p:ext>
     </p:extLst>
   </p:cSld>

</xml_diff>